<commit_message>
Final final design spec
</commit_message>
<xml_diff>
--- a/Design Specification.pptx
+++ b/Design Specification.pptx
@@ -4,17 +4,25 @@
   <p:sldMasterIdLst>
     <p:sldMasterId id="2147483648" r:id="rId1"/>
   </p:sldMasterIdLst>
+  <p:notesMasterIdLst>
+    <p:notesMasterId r:id="rId17"/>
+  </p:notesMasterIdLst>
   <p:sldIdLst>
-    <p:sldId id="265" r:id="rId2"/>
-    <p:sldId id="258" r:id="rId3"/>
-    <p:sldId id="259" r:id="rId4"/>
-    <p:sldId id="260" r:id="rId5"/>
-    <p:sldId id="261" r:id="rId6"/>
-    <p:sldId id="262" r:id="rId7"/>
-    <p:sldId id="263" r:id="rId8"/>
+    <p:sldId id="268" r:id="rId2"/>
+    <p:sldId id="265" r:id="rId3"/>
+    <p:sldId id="271" r:id="rId4"/>
+    <p:sldId id="270" r:id="rId5"/>
+    <p:sldId id="269" r:id="rId6"/>
+    <p:sldId id="272" r:id="rId7"/>
+    <p:sldId id="266" r:id="rId8"/>
     <p:sldId id="264" r:id="rId9"/>
-    <p:sldId id="266" r:id="rId10"/>
-    <p:sldId id="267" r:id="rId11"/>
+    <p:sldId id="258" r:id="rId10"/>
+    <p:sldId id="259" r:id="rId11"/>
+    <p:sldId id="260" r:id="rId12"/>
+    <p:sldId id="261" r:id="rId13"/>
+    <p:sldId id="262" r:id="rId14"/>
+    <p:sldId id="263" r:id="rId15"/>
+    <p:sldId id="267" r:id="rId16"/>
   </p:sldIdLst>
   <p:sldSz cx="17005300" cy="20104100"/>
   <p:notesSz cx="17005300" cy="20104100"/>
@@ -114,6 +122,440 @@
     </a:lvl9pPr>
   </p:defaultTextStyle>
 </p:presentation>
+</file>
+
+<file path=ppt/notesMasters/notesMaster1.xml><?xml version="1.0" encoding="utf-8"?>
+<p:notesMaster xmlns:a="http://schemas.openxmlformats.org/drawingml/2006/main" xmlns:r="http://schemas.openxmlformats.org/officeDocument/2006/relationships" xmlns:p="http://schemas.openxmlformats.org/presentationml/2006/main">
+  <p:cSld>
+    <p:bg>
+      <p:bgRef idx="1001">
+        <a:schemeClr val="bg1"/>
+      </p:bgRef>
+    </p:bg>
+    <p:spTree>
+      <p:nvGrpSpPr>
+        <p:cNvPr id="1" name=""/>
+        <p:cNvGrpSpPr/>
+        <p:nvPr/>
+      </p:nvGrpSpPr>
+      <p:grpSpPr>
+        <a:xfrm>
+          <a:off x="0" y="0"/>
+          <a:ext cx="0" cy="0"/>
+          <a:chOff x="0" y="0"/>
+          <a:chExt cx="0" cy="0"/>
+        </a:xfrm>
+      </p:grpSpPr>
+      <p:sp>
+        <p:nvSpPr>
+          <p:cNvPr id="2" name="Header Placeholder 1"/>
+          <p:cNvSpPr>
+            <a:spLocks noGrp="1"/>
+          </p:cNvSpPr>
+          <p:nvPr>
+            <p:ph type="hdr" sz="quarter"/>
+          </p:nvPr>
+        </p:nvSpPr>
+        <p:spPr>
+          <a:xfrm>
+            <a:off x="0" y="0"/>
+            <a:ext cx="7369175" cy="1004888"/>
+          </a:xfrm>
+          <a:prstGeom prst="rect">
+            <a:avLst/>
+          </a:prstGeom>
+        </p:spPr>
+        <p:txBody>
+          <a:bodyPr vert="horz" lIns="91440" tIns="45720" rIns="91440" bIns="45720" rtlCol="0"/>
+          <a:lstStyle>
+            <a:lvl1pPr algn="l">
+              <a:defRPr sz="1200"/>
+            </a:lvl1pPr>
+          </a:lstStyle>
+          <a:p>
+            <a:endParaRPr lang="en-GB"/>
+          </a:p>
+        </p:txBody>
+      </p:sp>
+      <p:sp>
+        <p:nvSpPr>
+          <p:cNvPr id="3" name="Date Placeholder 2"/>
+          <p:cNvSpPr>
+            <a:spLocks noGrp="1"/>
+          </p:cNvSpPr>
+          <p:nvPr>
+            <p:ph type="dt" idx="1"/>
+          </p:nvPr>
+        </p:nvSpPr>
+        <p:spPr>
+          <a:xfrm>
+            <a:off x="9632950" y="0"/>
+            <a:ext cx="7369175" cy="1004888"/>
+          </a:xfrm>
+          <a:prstGeom prst="rect">
+            <a:avLst/>
+          </a:prstGeom>
+        </p:spPr>
+        <p:txBody>
+          <a:bodyPr vert="horz" lIns="91440" tIns="45720" rIns="91440" bIns="45720" rtlCol="0"/>
+          <a:lstStyle>
+            <a:lvl1pPr algn="r">
+              <a:defRPr sz="1200"/>
+            </a:lvl1pPr>
+          </a:lstStyle>
+          <a:p>
+            <a:fld id="{0F75EBC1-C55C-4444-AFD7-A4780C1095EB}" type="datetimeFigureOut">
+              <a:rPr lang="en-GB" smtClean="0"/>
+              <a:t>23/02/2017</a:t>
+            </a:fld>
+            <a:endParaRPr lang="en-GB"/>
+          </a:p>
+        </p:txBody>
+      </p:sp>
+      <p:sp>
+        <p:nvSpPr>
+          <p:cNvPr id="4" name="Slide Image Placeholder 3"/>
+          <p:cNvSpPr>
+            <a:spLocks noGrp="1" noRot="1" noChangeAspect="1"/>
+          </p:cNvSpPr>
+          <p:nvPr>
+            <p:ph type="sldImg" idx="2"/>
+          </p:nvPr>
+        </p:nvSpPr>
+        <p:spPr>
+          <a:xfrm>
+            <a:off x="5313363" y="1508125"/>
+            <a:ext cx="6378575" cy="7539038"/>
+          </a:xfrm>
+          <a:prstGeom prst="rect">
+            <a:avLst/>
+          </a:prstGeom>
+          <a:noFill/>
+          <a:ln w="12700">
+            <a:solidFill>
+              <a:prstClr val="black"/>
+            </a:solidFill>
+          </a:ln>
+        </p:spPr>
+        <p:txBody>
+          <a:bodyPr vert="horz" lIns="91440" tIns="45720" rIns="91440" bIns="45720" rtlCol="0" anchor="ctr"/>
+          <a:lstStyle/>
+          <a:p>
+            <a:endParaRPr lang="en-GB"/>
+          </a:p>
+        </p:txBody>
+      </p:sp>
+      <p:sp>
+        <p:nvSpPr>
+          <p:cNvPr id="5" name="Notes Placeholder 4"/>
+          <p:cNvSpPr>
+            <a:spLocks noGrp="1"/>
+          </p:cNvSpPr>
+          <p:nvPr>
+            <p:ph type="body" sz="quarter" idx="3"/>
+          </p:nvPr>
+        </p:nvSpPr>
+        <p:spPr>
+          <a:xfrm>
+            <a:off x="1700213" y="9548813"/>
+            <a:ext cx="13604875" cy="9047162"/>
+          </a:xfrm>
+          <a:prstGeom prst="rect">
+            <a:avLst/>
+          </a:prstGeom>
+        </p:spPr>
+        <p:txBody>
+          <a:bodyPr vert="horz" lIns="91440" tIns="45720" rIns="91440" bIns="45720" rtlCol="0"/>
+          <a:lstStyle/>
+          <a:p>
+            <a:pPr lvl="0"/>
+            <a:r>
+              <a:rPr lang="en-US" smtClean="0"/>
+              <a:t>Click to edit Master text styles</a:t>
+            </a:r>
+          </a:p>
+          <a:p>
+            <a:pPr lvl="1"/>
+            <a:r>
+              <a:rPr lang="en-US" smtClean="0"/>
+              <a:t>Second level</a:t>
+            </a:r>
+          </a:p>
+          <a:p>
+            <a:pPr lvl="2"/>
+            <a:r>
+              <a:rPr lang="en-US" smtClean="0"/>
+              <a:t>Third level</a:t>
+            </a:r>
+          </a:p>
+          <a:p>
+            <a:pPr lvl="3"/>
+            <a:r>
+              <a:rPr lang="en-US" smtClean="0"/>
+              <a:t>Fourth level</a:t>
+            </a:r>
+          </a:p>
+          <a:p>
+            <a:pPr lvl="4"/>
+            <a:r>
+              <a:rPr lang="en-US" smtClean="0"/>
+              <a:t>Fifth level</a:t>
+            </a:r>
+            <a:endParaRPr lang="en-GB"/>
+          </a:p>
+        </p:txBody>
+      </p:sp>
+      <p:sp>
+        <p:nvSpPr>
+          <p:cNvPr id="6" name="Footer Placeholder 5"/>
+          <p:cNvSpPr>
+            <a:spLocks noGrp="1"/>
+          </p:cNvSpPr>
+          <p:nvPr>
+            <p:ph type="ftr" sz="quarter" idx="4"/>
+          </p:nvPr>
+        </p:nvSpPr>
+        <p:spPr>
+          <a:xfrm>
+            <a:off x="0" y="19096038"/>
+            <a:ext cx="7369175" cy="1004887"/>
+          </a:xfrm>
+          <a:prstGeom prst="rect">
+            <a:avLst/>
+          </a:prstGeom>
+        </p:spPr>
+        <p:txBody>
+          <a:bodyPr vert="horz" lIns="91440" tIns="45720" rIns="91440" bIns="45720" rtlCol="0" anchor="b"/>
+          <a:lstStyle>
+            <a:lvl1pPr algn="l">
+              <a:defRPr sz="1200"/>
+            </a:lvl1pPr>
+          </a:lstStyle>
+          <a:p>
+            <a:endParaRPr lang="en-GB"/>
+          </a:p>
+        </p:txBody>
+      </p:sp>
+      <p:sp>
+        <p:nvSpPr>
+          <p:cNvPr id="7" name="Slide Number Placeholder 6"/>
+          <p:cNvSpPr>
+            <a:spLocks noGrp="1"/>
+          </p:cNvSpPr>
+          <p:nvPr>
+            <p:ph type="sldNum" sz="quarter" idx="5"/>
+          </p:nvPr>
+        </p:nvSpPr>
+        <p:spPr>
+          <a:xfrm>
+            <a:off x="9632950" y="19096038"/>
+            <a:ext cx="7369175" cy="1004887"/>
+          </a:xfrm>
+          <a:prstGeom prst="rect">
+            <a:avLst/>
+          </a:prstGeom>
+        </p:spPr>
+        <p:txBody>
+          <a:bodyPr vert="horz" lIns="91440" tIns="45720" rIns="91440" bIns="45720" rtlCol="0" anchor="b"/>
+          <a:lstStyle>
+            <a:lvl1pPr algn="r">
+              <a:defRPr sz="1200"/>
+            </a:lvl1pPr>
+          </a:lstStyle>
+          <a:p>
+            <a:fld id="{48E8BBCA-02A1-4AFF-AAB0-EA399DE0395C}" type="slidenum">
+              <a:rPr lang="en-GB" smtClean="0"/>
+              <a:t>‹#›</a:t>
+            </a:fld>
+            <a:endParaRPr lang="en-GB"/>
+          </a:p>
+        </p:txBody>
+      </p:sp>
+    </p:spTree>
+    <p:extLst>
+      <p:ext uri="{BB962C8B-B14F-4D97-AF65-F5344CB8AC3E}">
+        <p14:creationId xmlns:p14="http://schemas.microsoft.com/office/powerpoint/2010/main" val="1196118188"/>
+      </p:ext>
+    </p:extLst>
+  </p:cSld>
+  <p:clrMap bg1="lt1" tx1="dk1" bg2="lt2" tx2="dk2" accent1="accent1" accent2="accent2" accent3="accent3" accent4="accent4" accent5="accent5" accent6="accent6" hlink="hlink" folHlink="folHlink"/>
+  <p:notesStyle>
+    <a:lvl1pPr marL="0" algn="l" defTabSz="914400" rtl="0" eaLnBrk="1" latinLnBrk="0" hangingPunct="1">
+      <a:defRPr sz="1200" kern="1200">
+        <a:solidFill>
+          <a:schemeClr val="tx1"/>
+        </a:solidFill>
+        <a:latin typeface="+mn-lt"/>
+        <a:ea typeface="+mn-ea"/>
+        <a:cs typeface="+mn-cs"/>
+      </a:defRPr>
+    </a:lvl1pPr>
+    <a:lvl2pPr marL="457200" algn="l" defTabSz="914400" rtl="0" eaLnBrk="1" latinLnBrk="0" hangingPunct="1">
+      <a:defRPr sz="1200" kern="1200">
+        <a:solidFill>
+          <a:schemeClr val="tx1"/>
+        </a:solidFill>
+        <a:latin typeface="+mn-lt"/>
+        <a:ea typeface="+mn-ea"/>
+        <a:cs typeface="+mn-cs"/>
+      </a:defRPr>
+    </a:lvl2pPr>
+    <a:lvl3pPr marL="914400" algn="l" defTabSz="914400" rtl="0" eaLnBrk="1" latinLnBrk="0" hangingPunct="1">
+      <a:defRPr sz="1200" kern="1200">
+        <a:solidFill>
+          <a:schemeClr val="tx1"/>
+        </a:solidFill>
+        <a:latin typeface="+mn-lt"/>
+        <a:ea typeface="+mn-ea"/>
+        <a:cs typeface="+mn-cs"/>
+      </a:defRPr>
+    </a:lvl3pPr>
+    <a:lvl4pPr marL="1371600" algn="l" defTabSz="914400" rtl="0" eaLnBrk="1" latinLnBrk="0" hangingPunct="1">
+      <a:defRPr sz="1200" kern="1200">
+        <a:solidFill>
+          <a:schemeClr val="tx1"/>
+        </a:solidFill>
+        <a:latin typeface="+mn-lt"/>
+        <a:ea typeface="+mn-ea"/>
+        <a:cs typeface="+mn-cs"/>
+      </a:defRPr>
+    </a:lvl4pPr>
+    <a:lvl5pPr marL="1828800" algn="l" defTabSz="914400" rtl="0" eaLnBrk="1" latinLnBrk="0" hangingPunct="1">
+      <a:defRPr sz="1200" kern="1200">
+        <a:solidFill>
+          <a:schemeClr val="tx1"/>
+        </a:solidFill>
+        <a:latin typeface="+mn-lt"/>
+        <a:ea typeface="+mn-ea"/>
+        <a:cs typeface="+mn-cs"/>
+      </a:defRPr>
+    </a:lvl5pPr>
+    <a:lvl6pPr marL="2286000" algn="l" defTabSz="914400" rtl="0" eaLnBrk="1" latinLnBrk="0" hangingPunct="1">
+      <a:defRPr sz="1200" kern="1200">
+        <a:solidFill>
+          <a:schemeClr val="tx1"/>
+        </a:solidFill>
+        <a:latin typeface="+mn-lt"/>
+        <a:ea typeface="+mn-ea"/>
+        <a:cs typeface="+mn-cs"/>
+      </a:defRPr>
+    </a:lvl6pPr>
+    <a:lvl7pPr marL="2743200" algn="l" defTabSz="914400" rtl="0" eaLnBrk="1" latinLnBrk="0" hangingPunct="1">
+      <a:defRPr sz="1200" kern="1200">
+        <a:solidFill>
+          <a:schemeClr val="tx1"/>
+        </a:solidFill>
+        <a:latin typeface="+mn-lt"/>
+        <a:ea typeface="+mn-ea"/>
+        <a:cs typeface="+mn-cs"/>
+      </a:defRPr>
+    </a:lvl7pPr>
+    <a:lvl8pPr marL="3200400" algn="l" defTabSz="914400" rtl="0" eaLnBrk="1" latinLnBrk="0" hangingPunct="1">
+      <a:defRPr sz="1200" kern="1200">
+        <a:solidFill>
+          <a:schemeClr val="tx1"/>
+        </a:solidFill>
+        <a:latin typeface="+mn-lt"/>
+        <a:ea typeface="+mn-ea"/>
+        <a:cs typeface="+mn-cs"/>
+      </a:defRPr>
+    </a:lvl8pPr>
+    <a:lvl9pPr marL="3657600" algn="l" defTabSz="914400" rtl="0" eaLnBrk="1" latinLnBrk="0" hangingPunct="1">
+      <a:defRPr sz="1200" kern="1200">
+        <a:solidFill>
+          <a:schemeClr val="tx1"/>
+        </a:solidFill>
+        <a:latin typeface="+mn-lt"/>
+        <a:ea typeface="+mn-ea"/>
+        <a:cs typeface="+mn-cs"/>
+      </a:defRPr>
+    </a:lvl9pPr>
+  </p:notesStyle>
+</p:notesMaster>
+</file>
+
+<file path=ppt/notesSlides/notesSlide1.xml><?xml version="1.0" encoding="utf-8"?>
+<p:notes xmlns:a="http://schemas.openxmlformats.org/drawingml/2006/main" xmlns:r="http://schemas.openxmlformats.org/officeDocument/2006/relationships" xmlns:p="http://schemas.openxmlformats.org/presentationml/2006/main">
+  <p:cSld>
+    <p:spTree>
+      <p:nvGrpSpPr>
+        <p:cNvPr id="1" name=""/>
+        <p:cNvGrpSpPr/>
+        <p:nvPr/>
+      </p:nvGrpSpPr>
+      <p:grpSpPr>
+        <a:xfrm>
+          <a:off x="0" y="0"/>
+          <a:ext cx="0" cy="0"/>
+          <a:chOff x="0" y="0"/>
+          <a:chExt cx="0" cy="0"/>
+        </a:xfrm>
+      </p:grpSpPr>
+      <p:sp>
+        <p:nvSpPr>
+          <p:cNvPr id="2" name="Slide Image Placeholder 1"/>
+          <p:cNvSpPr>
+            <a:spLocks noGrp="1" noRot="1" noChangeAspect="1"/>
+          </p:cNvSpPr>
+          <p:nvPr>
+            <p:ph type="sldImg"/>
+          </p:nvPr>
+        </p:nvSpPr>
+        <p:spPr/>
+      </p:sp>
+      <p:sp>
+        <p:nvSpPr>
+          <p:cNvPr id="3" name="Notes Placeholder 2"/>
+          <p:cNvSpPr>
+            <a:spLocks noGrp="1"/>
+          </p:cNvSpPr>
+          <p:nvPr>
+            <p:ph type="body" idx="1"/>
+          </p:nvPr>
+        </p:nvSpPr>
+        <p:spPr/>
+        <p:txBody>
+          <a:bodyPr/>
+          <a:lstStyle/>
+          <a:p>
+            <a:endParaRPr lang="en-GB" dirty="0"/>
+          </a:p>
+        </p:txBody>
+      </p:sp>
+      <p:sp>
+        <p:nvSpPr>
+          <p:cNvPr id="4" name="Slide Number Placeholder 3"/>
+          <p:cNvSpPr>
+            <a:spLocks noGrp="1"/>
+          </p:cNvSpPr>
+          <p:nvPr>
+            <p:ph type="sldNum" sz="quarter" idx="10"/>
+          </p:nvPr>
+        </p:nvSpPr>
+        <p:spPr/>
+        <p:txBody>
+          <a:bodyPr/>
+          <a:lstStyle/>
+          <a:p>
+            <a:fld id="{48E8BBCA-02A1-4AFF-AAB0-EA399DE0395C}" type="slidenum">
+              <a:rPr lang="en-GB" smtClean="0"/>
+              <a:t>4</a:t>
+            </a:fld>
+            <a:endParaRPr lang="en-GB"/>
+          </a:p>
+        </p:txBody>
+      </p:sp>
+    </p:spTree>
+    <p:extLst>
+      <p:ext uri="{BB962C8B-B14F-4D97-AF65-F5344CB8AC3E}">
+        <p14:creationId xmlns:p14="http://schemas.microsoft.com/office/powerpoint/2010/main" val="3474919517"/>
+      </p:ext>
+    </p:extLst>
+  </p:cSld>
+  <p:clrMapOvr>
+    <a:masterClrMapping/>
+  </p:clrMapOvr>
+</p:notes>
 </file>
 
 <file path=ppt/slideLayouts/slideLayout1.xml><?xml version="1.0" encoding="utf-8"?>
@@ -439,16 +881,55 @@
           <a:chExt cx="0" cy="0"/>
         </a:xfrm>
       </p:grpSpPr>
+      <p:pic>
+        <p:nvPicPr>
+          <p:cNvPr id="4098" name="Picture 2" descr="H:\Web App Development\Artbud\artbud_project\static\images\logo.jpg"/>
+          <p:cNvPicPr>
+            <a:picLocks noChangeAspect="1" noChangeArrowheads="1"/>
+          </p:cNvPicPr>
+          <p:nvPr/>
+        </p:nvPicPr>
+        <p:blipFill rotWithShape="1">
+          <a:blip r:embed="rId2">
+            <a:extLst>
+              <a:ext uri="{28A0092B-C50C-407E-A947-70E740481C1C}">
+                <a14:useLocalDpi xmlns:a14="http://schemas.microsoft.com/office/drawing/2010/main" val="0"/>
+              </a:ext>
+            </a:extLst>
+          </a:blip>
+          <a:srcRect l="9886" r="10859" b="3484"/>
+          <a:stretch/>
+        </p:blipFill>
+        <p:spPr bwMode="auto">
+          <a:xfrm>
+            <a:off x="1568450" y="1638300"/>
+            <a:ext cx="13208000" cy="8972550"/>
+          </a:xfrm>
+          <a:prstGeom prst="rect">
+            <a:avLst/>
+          </a:prstGeom>
+          <a:noFill/>
+          <a:extLst>
+            <a:ext uri="{909E8E84-426E-40DD-AFC4-6F175D3DCCD1}">
+              <a14:hiddenFill xmlns:a14="http://schemas.microsoft.com/office/drawing/2010/main">
+                <a:solidFill>
+                  <a:srgbClr val="FFFFFF"/>
+                </a:solidFill>
+              </a14:hiddenFill>
+            </a:ext>
+          </a:extLst>
+        </p:spPr>
+      </p:pic>
       <p:sp>
         <p:nvSpPr>
-          <p:cNvPr id="3" name="TextBox 2"/>
+          <p:cNvPr id="2" name="TextBox 1"/>
           <p:cNvSpPr txBox="1"/>
           <p:nvPr/>
         </p:nvSpPr>
         <p:spPr>
           <a:xfrm>
-            <a:off x="4845050" y="1079181"/>
-            <a:ext cx="9372600" cy="2215991"/>
+            <a:off x="1035050" y="12795250"/>
+            <a:ext cx="14782800" cy="4401205"/>
           </a:xfrm>
           <a:prstGeom prst="rect">
             <a:avLst/>
@@ -461,90 +942,65 @@
           </a:bodyPr>
           <a:lstStyle/>
           <a:p>
-            <a:r>
-              <a:rPr lang="en-GB" sz="13800" dirty="0" smtClean="0"/>
-              <a:t>Overview</a:t>
-            </a:r>
-            <a:endParaRPr lang="en-GB" sz="13800" dirty="0"/>
-          </a:p>
-        </p:txBody>
-      </p:sp>
-      <p:sp>
-        <p:nvSpPr>
-          <p:cNvPr id="4" name="TextBox 3"/>
-          <p:cNvSpPr txBox="1"/>
-          <p:nvPr/>
-        </p:nvSpPr>
-        <p:spPr>
-          <a:xfrm>
-            <a:off x="1492250" y="4032250"/>
-            <a:ext cx="14249400" cy="14219277"/>
-          </a:xfrm>
-          <a:prstGeom prst="rect">
-            <a:avLst/>
-          </a:prstGeom>
-          <a:noFill/>
-        </p:spPr>
-        <p:txBody>
-          <a:bodyPr wrap="square" rtlCol="0">
-            <a:spAutoFit/>
-          </a:bodyPr>
-          <a:lstStyle/>
-          <a:p>
-            <a:r>
-              <a:rPr lang="en-GB" sz="5400" dirty="0"/>
-              <a:t>Our application is place where art lovers can find, discuss, comment, like or dislike art pieces.</a:t>
-            </a:r>
-          </a:p>
-          <a:p>
-            <a:r>
-              <a:rPr lang="en-GB" sz="5400" dirty="0"/>
-              <a:t>The users will be able to display their art where they will receive ratings and comments. The application will provide a guide to the "world of art" for all art enthusiasts</a:t>
-            </a:r>
-            <a:r>
-              <a:rPr lang="en-GB" sz="5400" dirty="0" smtClean="0"/>
-              <a:t>.</a:t>
-            </a:r>
-          </a:p>
-          <a:p>
-            <a:endParaRPr lang="en-GB" sz="5400" dirty="0"/>
-          </a:p>
-          <a:p>
-            <a:r>
-              <a:rPr lang="en-GB" sz="5400" dirty="0"/>
-              <a:t>Art lovers will be able to see prices in a lot of different currencies for their </a:t>
-            </a:r>
-            <a:r>
-              <a:rPr lang="en-GB" sz="5400" dirty="0" smtClean="0"/>
-              <a:t>favourite </a:t>
-            </a:r>
-            <a:r>
-              <a:rPr lang="en-GB" sz="5400" dirty="0"/>
-              <a:t>art pieces and contact potential sellers or buyers. Users can feel free to comment on the art or on the price of the art piece and give feedback about the quality of the art</a:t>
-            </a:r>
-            <a:r>
-              <a:rPr lang="en-GB" sz="5400" dirty="0" smtClean="0"/>
-              <a:t>.</a:t>
-            </a:r>
-          </a:p>
-          <a:p>
-            <a:endParaRPr lang="en-GB" sz="5400" dirty="0"/>
-          </a:p>
-          <a:p>
-            <a:r>
-              <a:rPr lang="en-GB" sz="5400" dirty="0"/>
-              <a:t>It will be a place where art lovers feel like they're home.</a:t>
-            </a:r>
-          </a:p>
-          <a:p>
-            <a:endParaRPr lang="en-GB" sz="5400" dirty="0"/>
+            <a:pPr algn="ctr"/>
+            <a:r>
+              <a:rPr lang="en-GB" sz="4000" dirty="0" smtClean="0">
+                <a:latin typeface="Courier (W1)" pitchFamily="49" charset="0"/>
+              </a:rPr>
+              <a:t>Chief Executive Officer - Giles Munn</a:t>
+            </a:r>
+          </a:p>
+          <a:p>
+            <a:pPr algn="ctr"/>
+            <a:endParaRPr lang="en-GB" sz="4000" dirty="0">
+              <a:latin typeface="Courier (W1)" pitchFamily="49" charset="0"/>
+            </a:endParaRPr>
+          </a:p>
+          <a:p>
+            <a:pPr algn="ctr"/>
+            <a:r>
+              <a:rPr lang="en-GB" sz="4000" dirty="0" smtClean="0">
+                <a:latin typeface="Courier (W1)" pitchFamily="49" charset="0"/>
+              </a:rPr>
+              <a:t>Chief Operating Officer - Charlie Parker</a:t>
+            </a:r>
+          </a:p>
+          <a:p>
+            <a:pPr algn="ctr"/>
+            <a:endParaRPr lang="en-GB" sz="4000" dirty="0">
+              <a:latin typeface="Courier (W1)" pitchFamily="49" charset="0"/>
+            </a:endParaRPr>
+          </a:p>
+          <a:p>
+            <a:pPr algn="ctr"/>
+            <a:r>
+              <a:rPr lang="en-GB" sz="4000" dirty="0" smtClean="0">
+                <a:latin typeface="Courier (W1)" pitchFamily="49" charset="0"/>
+              </a:rPr>
+              <a:t>Vice President of Marketing - Dominik Bladek</a:t>
+            </a:r>
+          </a:p>
+          <a:p>
+            <a:pPr algn="ctr"/>
+            <a:endParaRPr lang="en-GB" sz="4000" dirty="0">
+              <a:latin typeface="Courier (W1)" pitchFamily="49" charset="0"/>
+            </a:endParaRPr>
+          </a:p>
+          <a:p>
+            <a:pPr algn="ctr"/>
+            <a:r>
+              <a:rPr lang="en-GB" sz="4000" dirty="0" smtClean="0">
+                <a:latin typeface="Courier (W1)" pitchFamily="49" charset="0"/>
+              </a:rPr>
+              <a:t>Chief Financial Officer - Andreas Klitis</a:t>
+            </a:r>
           </a:p>
         </p:txBody>
       </p:sp>
     </p:spTree>
     <p:extLst>
       <p:ext uri="{BB962C8B-B14F-4D97-AF65-F5344CB8AC3E}">
-        <p14:creationId xmlns:p14="http://schemas.microsoft.com/office/powerpoint/2010/main" val="1580760352"/>
+        <p14:creationId xmlns:p14="http://schemas.microsoft.com/office/powerpoint/2010/main" val="2124053381"/>
       </p:ext>
     </p:extLst>
   </p:cSld>
@@ -562,6 +1018,601 @@
 </file>
 
 <file path=ppt/slides/slide10.xml><?xml version="1.0" encoding="utf-8"?>
+<p:sld xmlns:a="http://schemas.openxmlformats.org/drawingml/2006/main" xmlns:r="http://schemas.openxmlformats.org/officeDocument/2006/relationships" xmlns:p="http://schemas.openxmlformats.org/presentationml/2006/main">
+  <p:cSld>
+    <p:spTree>
+      <p:nvGrpSpPr>
+        <p:cNvPr id="1" name=""/>
+        <p:cNvGrpSpPr/>
+        <p:nvPr/>
+      </p:nvGrpSpPr>
+      <p:grpSpPr>
+        <a:xfrm>
+          <a:off x="0" y="0"/>
+          <a:ext cx="0" cy="0"/>
+          <a:chOff x="0" y="0"/>
+          <a:chExt cx="0" cy="0"/>
+        </a:xfrm>
+      </p:grpSpPr>
+      <p:sp>
+        <p:nvSpPr>
+          <p:cNvPr id="2" name="object 2"/>
+          <p:cNvSpPr/>
+          <p:nvPr/>
+        </p:nvSpPr>
+        <p:spPr>
+          <a:xfrm>
+            <a:off x="0" y="0"/>
+            <a:ext cx="15260839" cy="20104100"/>
+          </a:xfrm>
+          <a:prstGeom prst="rect">
+            <a:avLst/>
+          </a:prstGeom>
+          <a:blipFill>
+            <a:blip r:embed="rId2" cstate="print"/>
+            <a:stretch>
+              <a:fillRect/>
+            </a:stretch>
+          </a:blipFill>
+        </p:spPr>
+        <p:txBody>
+          <a:bodyPr wrap="square" lIns="0" tIns="0" rIns="0" bIns="0" rtlCol="0">
+            <a:noAutofit/>
+          </a:bodyPr>
+          <a:lstStyle/>
+          <a:p>
+            <a:endParaRPr/>
+          </a:p>
+        </p:txBody>
+      </p:sp>
+    </p:spTree>
+  </p:cSld>
+  <p:clrMapOvr>
+    <a:masterClrMapping/>
+  </p:clrMapOvr>
+  <p:timing>
+    <p:tnLst>
+      <p:par>
+        <p:cTn id="1" dur="indefinite" restart="never" nodeType="tmRoot"/>
+      </p:par>
+    </p:tnLst>
+  </p:timing>
+</p:sld>
+</file>
+
+<file path=ppt/slides/slide11.xml><?xml version="1.0" encoding="utf-8"?>
+<p:sld xmlns:a="http://schemas.openxmlformats.org/drawingml/2006/main" xmlns:r="http://schemas.openxmlformats.org/officeDocument/2006/relationships" xmlns:p="http://schemas.openxmlformats.org/presentationml/2006/main">
+  <p:cSld>
+    <p:spTree>
+      <p:nvGrpSpPr>
+        <p:cNvPr id="1" name=""/>
+        <p:cNvGrpSpPr/>
+        <p:nvPr/>
+      </p:nvGrpSpPr>
+      <p:grpSpPr>
+        <a:xfrm>
+          <a:off x="0" y="0"/>
+          <a:ext cx="0" cy="0"/>
+          <a:chOff x="0" y="0"/>
+          <a:chExt cx="0" cy="0"/>
+        </a:xfrm>
+      </p:grpSpPr>
+      <p:sp>
+        <p:nvSpPr>
+          <p:cNvPr id="2" name="object 2"/>
+          <p:cNvSpPr/>
+          <p:nvPr/>
+        </p:nvSpPr>
+        <p:spPr>
+          <a:xfrm>
+            <a:off x="0" y="0"/>
+            <a:ext cx="16933291" cy="18982309"/>
+          </a:xfrm>
+          <a:prstGeom prst="rect">
+            <a:avLst/>
+          </a:prstGeom>
+          <a:blipFill>
+            <a:blip r:embed="rId2" cstate="print"/>
+            <a:stretch>
+              <a:fillRect/>
+            </a:stretch>
+          </a:blipFill>
+        </p:spPr>
+        <p:txBody>
+          <a:bodyPr wrap="square" lIns="0" tIns="0" rIns="0" bIns="0" rtlCol="0">
+            <a:noAutofit/>
+          </a:bodyPr>
+          <a:lstStyle/>
+          <a:p>
+            <a:endParaRPr/>
+          </a:p>
+        </p:txBody>
+      </p:sp>
+    </p:spTree>
+  </p:cSld>
+  <p:clrMapOvr>
+    <a:masterClrMapping/>
+  </p:clrMapOvr>
+  <p:timing>
+    <p:tnLst>
+      <p:par>
+        <p:cTn id="1" dur="indefinite" restart="never" nodeType="tmRoot"/>
+      </p:par>
+    </p:tnLst>
+  </p:timing>
+</p:sld>
+</file>
+
+<file path=ppt/slides/slide12.xml><?xml version="1.0" encoding="utf-8"?>
+<p:sld xmlns:a="http://schemas.openxmlformats.org/drawingml/2006/main" xmlns:r="http://schemas.openxmlformats.org/officeDocument/2006/relationships" xmlns:p="http://schemas.openxmlformats.org/presentationml/2006/main">
+  <p:cSld>
+    <p:spTree>
+      <p:nvGrpSpPr>
+        <p:cNvPr id="1" name=""/>
+        <p:cNvGrpSpPr/>
+        <p:nvPr/>
+      </p:nvGrpSpPr>
+      <p:grpSpPr>
+        <a:xfrm>
+          <a:off x="0" y="0"/>
+          <a:ext cx="0" cy="0"/>
+          <a:chOff x="0" y="0"/>
+          <a:chExt cx="0" cy="0"/>
+        </a:xfrm>
+      </p:grpSpPr>
+      <p:sp>
+        <p:nvSpPr>
+          <p:cNvPr id="2" name="object 2"/>
+          <p:cNvSpPr/>
+          <p:nvPr/>
+        </p:nvSpPr>
+        <p:spPr>
+          <a:xfrm>
+            <a:off x="0" y="0"/>
+            <a:ext cx="17001109" cy="18982309"/>
+          </a:xfrm>
+          <a:prstGeom prst="rect">
+            <a:avLst/>
+          </a:prstGeom>
+          <a:blipFill>
+            <a:blip r:embed="rId2" cstate="print"/>
+            <a:stretch>
+              <a:fillRect/>
+            </a:stretch>
+          </a:blipFill>
+        </p:spPr>
+        <p:txBody>
+          <a:bodyPr wrap="square" lIns="0" tIns="0" rIns="0" bIns="0" rtlCol="0">
+            <a:noAutofit/>
+          </a:bodyPr>
+          <a:lstStyle/>
+          <a:p>
+            <a:endParaRPr/>
+          </a:p>
+        </p:txBody>
+      </p:sp>
+    </p:spTree>
+  </p:cSld>
+  <p:clrMapOvr>
+    <a:masterClrMapping/>
+  </p:clrMapOvr>
+  <p:timing>
+    <p:tnLst>
+      <p:par>
+        <p:cTn id="1" dur="indefinite" restart="never" nodeType="tmRoot"/>
+      </p:par>
+    </p:tnLst>
+  </p:timing>
+</p:sld>
+</file>
+
+<file path=ppt/slides/slide13.xml><?xml version="1.0" encoding="utf-8"?>
+<p:sld xmlns:a="http://schemas.openxmlformats.org/drawingml/2006/main" xmlns:r="http://schemas.openxmlformats.org/officeDocument/2006/relationships" xmlns:p="http://schemas.openxmlformats.org/presentationml/2006/main">
+  <p:cSld>
+    <p:spTree>
+      <p:nvGrpSpPr>
+        <p:cNvPr id="1" name=""/>
+        <p:cNvGrpSpPr/>
+        <p:nvPr/>
+      </p:nvGrpSpPr>
+      <p:grpSpPr>
+        <a:xfrm>
+          <a:off x="0" y="0"/>
+          <a:ext cx="0" cy="0"/>
+          <a:chOff x="0" y="0"/>
+          <a:chExt cx="0" cy="0"/>
+        </a:xfrm>
+      </p:grpSpPr>
+      <p:sp>
+        <p:nvSpPr>
+          <p:cNvPr id="2" name="object 2"/>
+          <p:cNvSpPr/>
+          <p:nvPr/>
+        </p:nvSpPr>
+        <p:spPr>
+          <a:xfrm>
+            <a:off x="0" y="0"/>
+            <a:ext cx="16933291" cy="18982309"/>
+          </a:xfrm>
+          <a:prstGeom prst="rect">
+            <a:avLst/>
+          </a:prstGeom>
+          <a:blipFill>
+            <a:blip r:embed="rId2" cstate="print"/>
+            <a:stretch>
+              <a:fillRect/>
+            </a:stretch>
+          </a:blipFill>
+        </p:spPr>
+        <p:txBody>
+          <a:bodyPr wrap="square" lIns="0" tIns="0" rIns="0" bIns="0" rtlCol="0">
+            <a:noAutofit/>
+          </a:bodyPr>
+          <a:lstStyle/>
+          <a:p>
+            <a:endParaRPr/>
+          </a:p>
+        </p:txBody>
+      </p:sp>
+    </p:spTree>
+  </p:cSld>
+  <p:clrMapOvr>
+    <a:masterClrMapping/>
+  </p:clrMapOvr>
+  <p:timing>
+    <p:tnLst>
+      <p:par>
+        <p:cTn id="1" dur="indefinite" restart="never" nodeType="tmRoot"/>
+      </p:par>
+    </p:tnLst>
+  </p:timing>
+</p:sld>
+</file>
+
+<file path=ppt/slides/slide14.xml><?xml version="1.0" encoding="utf-8"?>
+<p:sld xmlns:a="http://schemas.openxmlformats.org/drawingml/2006/main" xmlns:r="http://schemas.openxmlformats.org/officeDocument/2006/relationships" xmlns:p="http://schemas.openxmlformats.org/presentationml/2006/main">
+  <p:cSld>
+    <p:spTree>
+      <p:nvGrpSpPr>
+        <p:cNvPr id="1" name=""/>
+        <p:cNvGrpSpPr/>
+        <p:nvPr/>
+      </p:nvGrpSpPr>
+      <p:grpSpPr>
+        <a:xfrm>
+          <a:off x="0" y="0"/>
+          <a:ext cx="0" cy="0"/>
+          <a:chOff x="0" y="0"/>
+          <a:chExt cx="0" cy="0"/>
+        </a:xfrm>
+      </p:grpSpPr>
+      <p:sp>
+        <p:nvSpPr>
+          <p:cNvPr id="3" name="TextBox 2"/>
+          <p:cNvSpPr txBox="1"/>
+          <p:nvPr/>
+        </p:nvSpPr>
+        <p:spPr>
+          <a:xfrm>
+            <a:off x="1416050" y="4565650"/>
+            <a:ext cx="14782800" cy="13388280"/>
+          </a:xfrm>
+          <a:prstGeom prst="rect">
+            <a:avLst/>
+          </a:prstGeom>
+          <a:noFill/>
+        </p:spPr>
+        <p:txBody>
+          <a:bodyPr wrap="square" rtlCol="0">
+            <a:spAutoFit/>
+          </a:bodyPr>
+          <a:lstStyle/>
+          <a:p>
+            <a:pPr marL="685800" lvl="0" indent="-685800">
+              <a:buFont typeface="Arial" panose="020B0604020202020204" pitchFamily="34" charset="0"/>
+              <a:buChar char="•"/>
+            </a:pPr>
+            <a:r>
+              <a:rPr lang="en-GB" sz="4800" dirty="0"/>
+              <a:t>/home</a:t>
+            </a:r>
+            <a:endParaRPr lang="en-GB" sz="4400" dirty="0"/>
+          </a:p>
+          <a:p>
+            <a:pPr marL="685800" lvl="0" indent="-685800">
+              <a:buFont typeface="Arial" panose="020B0604020202020204" pitchFamily="34" charset="0"/>
+              <a:buChar char="•"/>
+            </a:pPr>
+            <a:r>
+              <a:rPr lang="en-GB" sz="4800" dirty="0"/>
+              <a:t>/site-news</a:t>
+            </a:r>
+            <a:endParaRPr lang="en-GB" sz="4400" dirty="0"/>
+          </a:p>
+          <a:p>
+            <a:pPr marL="685800" lvl="0" indent="-685800">
+              <a:buFont typeface="Arial" panose="020B0604020202020204" pitchFamily="34" charset="0"/>
+              <a:buChar char="•"/>
+            </a:pPr>
+            <a:r>
+              <a:rPr lang="en-GB" sz="4800" dirty="0"/>
+              <a:t>/about</a:t>
+            </a:r>
+            <a:endParaRPr lang="en-GB" sz="4400" dirty="0"/>
+          </a:p>
+          <a:p>
+            <a:pPr marL="685800" lvl="0" indent="-685800">
+              <a:buFont typeface="Arial" panose="020B0604020202020204" pitchFamily="34" charset="0"/>
+              <a:buChar char="•"/>
+            </a:pPr>
+            <a:r>
+              <a:rPr lang="en-GB" sz="4800" dirty="0"/>
+              <a:t>/index</a:t>
+            </a:r>
+            <a:endParaRPr lang="en-GB" sz="4400" dirty="0"/>
+          </a:p>
+          <a:p>
+            <a:pPr marL="685800" lvl="0" indent="-685800">
+              <a:buFont typeface="Arial" panose="020B0604020202020204" pitchFamily="34" charset="0"/>
+              <a:buChar char="•"/>
+            </a:pPr>
+            <a:r>
+              <a:rPr lang="en-GB" sz="4800" dirty="0"/>
+              <a:t>/</a:t>
+            </a:r>
+            <a:r>
+              <a:rPr lang="en-GB" sz="4800" dirty="0" smtClean="0"/>
+              <a:t>contact-us</a:t>
+            </a:r>
+            <a:endParaRPr lang="en-GB" sz="4400" dirty="0"/>
+          </a:p>
+          <a:p>
+            <a:pPr marL="685800" lvl="0" indent="-685800">
+              <a:buFont typeface="Arial" panose="020B0604020202020204" pitchFamily="34" charset="0"/>
+              <a:buChar char="•"/>
+            </a:pPr>
+            <a:r>
+              <a:rPr lang="en-GB" sz="4800" dirty="0" smtClean="0"/>
+              <a:t>/view</a:t>
+            </a:r>
+            <a:endParaRPr lang="en-GB" sz="4400" dirty="0"/>
+          </a:p>
+          <a:p>
+            <a:pPr marL="1600200" lvl="2" indent="-685800">
+              <a:buFont typeface="Arial" panose="020B0604020202020204" pitchFamily="34" charset="0"/>
+              <a:buChar char="•"/>
+            </a:pPr>
+            <a:r>
+              <a:rPr lang="en-GB" sz="4800" dirty="0" smtClean="0"/>
+              <a:t>/view</a:t>
+            </a:r>
+            <a:r>
+              <a:rPr lang="en-GB" sz="4800" dirty="0"/>
+              <a:t>/{{username</a:t>
+            </a:r>
+            <a:r>
+              <a:rPr lang="en-GB" sz="4800" dirty="0" smtClean="0"/>
+              <a:t>}}</a:t>
+            </a:r>
+            <a:endParaRPr lang="en-GB" sz="4400" dirty="0"/>
+          </a:p>
+          <a:p>
+            <a:pPr marL="685800" lvl="0" indent="-685800">
+              <a:buFont typeface="Arial" panose="020B0604020202020204" pitchFamily="34" charset="0"/>
+              <a:buChar char="•"/>
+            </a:pPr>
+            <a:r>
+              <a:rPr lang="en-GB" sz="4800" dirty="0"/>
+              <a:t>/</a:t>
+            </a:r>
+            <a:r>
+              <a:rPr lang="en-GB" sz="4800" dirty="0" smtClean="0"/>
+              <a:t>login</a:t>
+            </a:r>
+            <a:endParaRPr lang="en-GB" sz="4400" dirty="0" smtClean="0"/>
+          </a:p>
+          <a:p>
+            <a:pPr marL="1600200" lvl="2" indent="-685800">
+              <a:buFont typeface="Arial" panose="020B0604020202020204" pitchFamily="34" charset="0"/>
+              <a:buChar char="•"/>
+            </a:pPr>
+            <a:r>
+              <a:rPr lang="en-GB" sz="4800" dirty="0" smtClean="0"/>
+              <a:t>/login/</a:t>
+            </a:r>
+            <a:r>
+              <a:rPr lang="en-GB" sz="4800" dirty="0" err="1" smtClean="0"/>
+              <a:t>myaccount</a:t>
+            </a:r>
+            <a:endParaRPr lang="en-GB" sz="4400" dirty="0" smtClean="0"/>
+          </a:p>
+          <a:p>
+            <a:pPr marL="2514600" lvl="4" indent="-685800">
+              <a:buFont typeface="Arial" panose="020B0604020202020204" pitchFamily="34" charset="0"/>
+              <a:buChar char="•"/>
+            </a:pPr>
+            <a:r>
+              <a:rPr lang="en-GB" sz="4800" dirty="0" smtClean="0"/>
+              <a:t>/login/</a:t>
+            </a:r>
+            <a:r>
+              <a:rPr lang="en-GB" sz="4800" dirty="0" err="1" smtClean="0"/>
+              <a:t>myaccount</a:t>
+            </a:r>
+            <a:r>
+              <a:rPr lang="en-GB" sz="4800" dirty="0" smtClean="0"/>
+              <a:t>/upload</a:t>
+            </a:r>
+            <a:endParaRPr lang="en-GB" sz="4400" dirty="0"/>
+          </a:p>
+          <a:p>
+            <a:pPr marL="2514600" lvl="4" indent="-685800">
+              <a:buFont typeface="Arial" panose="020B0604020202020204" pitchFamily="34" charset="0"/>
+              <a:buChar char="•"/>
+            </a:pPr>
+            <a:r>
+              <a:rPr lang="en-GB" sz="4800" dirty="0" smtClean="0"/>
+              <a:t>/</a:t>
+            </a:r>
+            <a:r>
+              <a:rPr lang="en-GB" sz="4800" dirty="0"/>
+              <a:t>login/</a:t>
+            </a:r>
+            <a:r>
+              <a:rPr lang="en-GB" sz="4800" dirty="0" err="1"/>
+              <a:t>myaccount</a:t>
+            </a:r>
+            <a:r>
+              <a:rPr lang="en-GB" sz="4800" dirty="0"/>
+              <a:t>/settings</a:t>
+            </a:r>
+            <a:endParaRPr lang="en-GB" sz="4400" dirty="0"/>
+          </a:p>
+          <a:p>
+            <a:pPr marL="3429000" lvl="6" indent="-685800">
+              <a:buFont typeface="Arial" panose="020B0604020202020204" pitchFamily="34" charset="0"/>
+              <a:buChar char="•"/>
+            </a:pPr>
+            <a:r>
+              <a:rPr lang="en-GB" sz="4800" dirty="0"/>
+              <a:t>/login/</a:t>
+            </a:r>
+            <a:r>
+              <a:rPr lang="en-GB" sz="4800" dirty="0" err="1"/>
+              <a:t>myaccount</a:t>
+            </a:r>
+            <a:r>
+              <a:rPr lang="en-GB" sz="4800" dirty="0"/>
+              <a:t>/settings/{{</a:t>
+            </a:r>
+            <a:r>
+              <a:rPr lang="en-GB" sz="4800" dirty="0" err="1"/>
+              <a:t>artname</a:t>
+            </a:r>
+            <a:r>
+              <a:rPr lang="en-GB" sz="4800" dirty="0"/>
+              <a:t>}}</a:t>
+            </a:r>
+            <a:endParaRPr lang="en-GB" sz="4400" dirty="0"/>
+          </a:p>
+          <a:p>
+            <a:pPr marL="685800" lvl="0" indent="-685800">
+              <a:buFont typeface="Arial" panose="020B0604020202020204" pitchFamily="34" charset="0"/>
+              <a:buChar char="•"/>
+            </a:pPr>
+            <a:r>
+              <a:rPr lang="en-GB" sz="4800" dirty="0"/>
+              <a:t>/categories</a:t>
+            </a:r>
+            <a:endParaRPr lang="en-GB" sz="4400" dirty="0"/>
+          </a:p>
+          <a:p>
+            <a:pPr marL="1600200" lvl="2" indent="-685800">
+              <a:buFont typeface="Arial" panose="020B0604020202020204" pitchFamily="34" charset="0"/>
+              <a:buChar char="•"/>
+            </a:pPr>
+            <a:r>
+              <a:rPr lang="en-GB" sz="4800" dirty="0"/>
+              <a:t>/categories/painting</a:t>
+            </a:r>
+            <a:endParaRPr lang="en-GB" sz="4400" dirty="0"/>
+          </a:p>
+          <a:p>
+            <a:pPr marL="1600200" lvl="2" indent="-685800">
+              <a:buFont typeface="Arial" panose="020B0604020202020204" pitchFamily="34" charset="0"/>
+              <a:buChar char="•"/>
+            </a:pPr>
+            <a:r>
+              <a:rPr lang="en-GB" sz="4800" dirty="0"/>
+              <a:t>/categories/photography</a:t>
+            </a:r>
+            <a:endParaRPr lang="en-GB" sz="4400" dirty="0"/>
+          </a:p>
+          <a:p>
+            <a:pPr marL="1600200" lvl="2" indent="-685800">
+              <a:buFont typeface="Arial" panose="020B0604020202020204" pitchFamily="34" charset="0"/>
+              <a:buChar char="•"/>
+            </a:pPr>
+            <a:r>
+              <a:rPr lang="en-GB" sz="4800" dirty="0"/>
+              <a:t>/categories/sculptures</a:t>
+            </a:r>
+            <a:endParaRPr lang="en-GB" sz="4400" dirty="0"/>
+          </a:p>
+          <a:p>
+            <a:pPr marL="1600200" lvl="2" indent="-685800">
+              <a:buFont typeface="Arial" panose="020B0604020202020204" pitchFamily="34" charset="0"/>
+              <a:buChar char="•"/>
+            </a:pPr>
+            <a:r>
+              <a:rPr lang="en-GB" sz="4800" dirty="0"/>
+              <a:t>/categories/drawings</a:t>
+            </a:r>
+            <a:endParaRPr lang="en-GB" sz="4400" dirty="0"/>
+          </a:p>
+          <a:p>
+            <a:pPr marL="1600200" lvl="2" indent="-685800">
+              <a:buFont typeface="Arial" panose="020B0604020202020204" pitchFamily="34" charset="0"/>
+              <a:buChar char="•"/>
+            </a:pPr>
+            <a:r>
+              <a:rPr lang="en-GB" sz="4800" dirty="0"/>
+              <a:t>/categories/other</a:t>
+            </a:r>
+          </a:p>
+        </p:txBody>
+      </p:sp>
+      <p:sp>
+        <p:nvSpPr>
+          <p:cNvPr id="4" name="TextBox 3"/>
+          <p:cNvSpPr txBox="1"/>
+          <p:nvPr/>
+        </p:nvSpPr>
+        <p:spPr>
+          <a:xfrm>
+            <a:off x="4540250" y="1054259"/>
+            <a:ext cx="9067800" cy="2215991"/>
+          </a:xfrm>
+          <a:prstGeom prst="rect">
+            <a:avLst/>
+          </a:prstGeom>
+          <a:noFill/>
+        </p:spPr>
+        <p:txBody>
+          <a:bodyPr wrap="square" rtlCol="0">
+            <a:spAutoFit/>
+          </a:bodyPr>
+          <a:lstStyle/>
+          <a:p>
+            <a:r>
+              <a:rPr lang="en-GB" sz="13800" dirty="0" smtClean="0"/>
+              <a:t>Site URLS</a:t>
+            </a:r>
+            <a:endParaRPr lang="en-GB" sz="13800" dirty="0"/>
+          </a:p>
+        </p:txBody>
+      </p:sp>
+    </p:spTree>
+    <p:extLst>
+      <p:ext uri="{BB962C8B-B14F-4D97-AF65-F5344CB8AC3E}">
+        <p14:creationId xmlns:p14="http://schemas.microsoft.com/office/powerpoint/2010/main" val="3879730413"/>
+      </p:ext>
+    </p:extLst>
+  </p:cSld>
+  <p:clrMapOvr>
+    <a:masterClrMapping/>
+  </p:clrMapOvr>
+  <p:timing>
+    <p:tnLst>
+      <p:par>
+        <p:cTn id="1" dur="indefinite" restart="never" nodeType="tmRoot"/>
+      </p:par>
+    </p:tnLst>
+  </p:timing>
+</p:sld>
+</file>
+
+<file path=ppt/slides/slide15.xml><?xml version="1.0" encoding="utf-8"?>
 <p:sld xmlns:a="http://schemas.openxmlformats.org/drawingml/2006/main" xmlns:r="http://schemas.openxmlformats.org/officeDocument/2006/relationships" xmlns:p="http://schemas.openxmlformats.org/presentationml/2006/main">
   <p:cSld>
     <p:spTree>
@@ -672,6 +1723,13 @@
   <p:clrMapOvr>
     <a:masterClrMapping/>
   </p:clrMapOvr>
+  <p:timing>
+    <p:tnLst>
+      <p:par>
+        <p:cTn id="1" dur="indefinite" restart="never" nodeType="tmRoot"/>
+      </p:par>
+    </p:tnLst>
+  </p:timing>
 </p:sld>
 </file>
 
@@ -694,36 +1752,112 @@
       </p:grpSpPr>
       <p:sp>
         <p:nvSpPr>
-          <p:cNvPr id="2" name="object 2"/>
-          <p:cNvSpPr/>
+          <p:cNvPr id="3" name="TextBox 2"/>
+          <p:cNvSpPr txBox="1"/>
           <p:nvPr/>
         </p:nvSpPr>
         <p:spPr>
           <a:xfrm>
-            <a:off x="72009" y="0"/>
-            <a:ext cx="16933291" cy="18982309"/>
+            <a:off x="4845050" y="1079181"/>
+            <a:ext cx="9372600" cy="2215991"/>
           </a:xfrm>
           <a:prstGeom prst="rect">
             <a:avLst/>
           </a:prstGeom>
-          <a:blipFill>
-            <a:blip r:embed="rId2" cstate="print"/>
-            <a:stretch>
-              <a:fillRect/>
-            </a:stretch>
-          </a:blipFill>
+          <a:noFill/>
         </p:spPr>
         <p:txBody>
-          <a:bodyPr wrap="square" lIns="0" tIns="0" rIns="0" bIns="0" rtlCol="0">
-            <a:noAutofit/>
+          <a:bodyPr wrap="square" rtlCol="0">
+            <a:spAutoFit/>
           </a:bodyPr>
           <a:lstStyle/>
           <a:p>
-            <a:endParaRPr/>
+            <a:r>
+              <a:rPr lang="en-GB" sz="13800" dirty="0" smtClean="0"/>
+              <a:t>Overview</a:t>
+            </a:r>
+            <a:endParaRPr lang="en-GB" sz="13800" dirty="0"/>
+          </a:p>
+        </p:txBody>
+      </p:sp>
+      <p:sp>
+        <p:nvSpPr>
+          <p:cNvPr id="4" name="TextBox 3"/>
+          <p:cNvSpPr txBox="1"/>
+          <p:nvPr/>
+        </p:nvSpPr>
+        <p:spPr>
+          <a:xfrm>
+            <a:off x="1492250" y="4032250"/>
+            <a:ext cx="14249400" cy="14219277"/>
+          </a:xfrm>
+          <a:prstGeom prst="rect">
+            <a:avLst/>
+          </a:prstGeom>
+          <a:noFill/>
+        </p:spPr>
+        <p:txBody>
+          <a:bodyPr wrap="square" rtlCol="0">
+            <a:spAutoFit/>
+          </a:bodyPr>
+          <a:lstStyle/>
+          <a:p>
+            <a:r>
+              <a:rPr lang="en-GB" sz="5400" dirty="0"/>
+              <a:t>Our application is place where art lovers can find, discuss, comment, like or dislike art pieces.</a:t>
+            </a:r>
+          </a:p>
+          <a:p>
+            <a:r>
+              <a:rPr lang="en-GB" sz="5400" dirty="0"/>
+              <a:t>The users will be able to display their art where they will receive ratings and comments. The application will provide a guide to the "world of art" for all art enthusiasts</a:t>
+            </a:r>
+            <a:r>
+              <a:rPr lang="en-GB" sz="5400" dirty="0" smtClean="0"/>
+              <a:t>.</a:t>
+            </a:r>
+          </a:p>
+          <a:p>
+            <a:endParaRPr lang="en-GB" sz="5400" dirty="0"/>
+          </a:p>
+          <a:p>
+            <a:r>
+              <a:rPr lang="en-GB" sz="5400" dirty="0"/>
+              <a:t>Art lovers will be able to see prices in a lot of different currencies for their </a:t>
+            </a:r>
+            <a:r>
+              <a:rPr lang="en-GB" sz="5400" dirty="0" smtClean="0"/>
+              <a:t>favourite </a:t>
+            </a:r>
+            <a:r>
+              <a:rPr lang="en-GB" sz="5400" dirty="0"/>
+              <a:t>art pieces and contact potential sellers or buyers. Users can feel free to comment on the art or on the price of the art piece and give feedback about the quality of the art</a:t>
+            </a:r>
+            <a:r>
+              <a:rPr lang="en-GB" sz="5400" dirty="0" smtClean="0"/>
+              <a:t>.</a:t>
+            </a:r>
+          </a:p>
+          <a:p>
+            <a:endParaRPr lang="en-GB" sz="5400" dirty="0"/>
+          </a:p>
+          <a:p>
+            <a:r>
+              <a:rPr lang="en-GB" sz="5400" dirty="0"/>
+              <a:t>It will be a place where art lovers feel like they're home.</a:t>
+            </a:r>
+          </a:p>
+          <a:p>
+            <a:endParaRPr lang="en-GB" sz="5400" dirty="0"/>
           </a:p>
         </p:txBody>
       </p:sp>
     </p:spTree>
+    <p:extLst>
+      <p:ext uri="{BB962C8B-B14F-4D97-AF65-F5344CB8AC3E}">
+        <p14:creationId xmlns:p14="http://schemas.microsoft.com/office/powerpoint/2010/main" val="1580760352"/>
+      </p:ext>
+    </p:extLst>
   </p:cSld>
   <p:clrMapOvr>
     <a:masterClrMapping/>
@@ -757,36 +1891,254 @@
       </p:grpSpPr>
       <p:sp>
         <p:nvSpPr>
-          <p:cNvPr id="2" name="object 2"/>
-          <p:cNvSpPr/>
+          <p:cNvPr id="2" name="Content Placeholder 2"/>
+          <p:cNvSpPr txBox="1">
+            <a:spLocks/>
+          </p:cNvSpPr>
           <p:nvPr/>
         </p:nvSpPr>
         <p:spPr>
           <a:xfrm>
-            <a:off x="0" y="0"/>
-            <a:ext cx="15260839" cy="20104100"/>
+            <a:off x="958850" y="3651250"/>
+            <a:ext cx="15474950" cy="4989264"/>
           </a:xfrm>
           <a:prstGeom prst="rect">
             <a:avLst/>
           </a:prstGeom>
-          <a:blipFill>
-            <a:blip r:embed="rId2" cstate="print"/>
-            <a:stretch>
-              <a:fillRect/>
-            </a:stretch>
-          </a:blipFill>
         </p:spPr>
         <p:txBody>
-          <a:bodyPr wrap="square" lIns="0" tIns="0" rIns="0" bIns="0" rtlCol="0">
-            <a:noAutofit/>
+          <a:bodyPr/>
+          <a:lstStyle>
+            <a:lvl1pPr marL="342900" indent="-342900" algn="l" defTabSz="914400" rtl="0" eaLnBrk="1" latinLnBrk="0" hangingPunct="1">
+              <a:spcBef>
+                <a:spcPct val="20000"/>
+              </a:spcBef>
+              <a:buFont typeface="Arial" pitchFamily="34" charset="0"/>
+              <a:buChar char="•"/>
+              <a:defRPr sz="3200" kern="1200">
+                <a:solidFill>
+                  <a:schemeClr val="tx1"/>
+                </a:solidFill>
+                <a:latin typeface="+mn-lt"/>
+                <a:ea typeface="+mn-ea"/>
+                <a:cs typeface="+mn-cs"/>
+              </a:defRPr>
+            </a:lvl1pPr>
+            <a:lvl2pPr marL="742950" indent="-285750" algn="l" defTabSz="914400" rtl="0" eaLnBrk="1" latinLnBrk="0" hangingPunct="1">
+              <a:spcBef>
+                <a:spcPct val="20000"/>
+              </a:spcBef>
+              <a:buFont typeface="Arial" pitchFamily="34" charset="0"/>
+              <a:buChar char="–"/>
+              <a:defRPr sz="2800" kern="1200">
+                <a:solidFill>
+                  <a:schemeClr val="tx1"/>
+                </a:solidFill>
+                <a:latin typeface="+mn-lt"/>
+                <a:ea typeface="+mn-ea"/>
+                <a:cs typeface="+mn-cs"/>
+              </a:defRPr>
+            </a:lvl2pPr>
+            <a:lvl3pPr marL="1143000" indent="-228600" algn="l" defTabSz="914400" rtl="0" eaLnBrk="1" latinLnBrk="0" hangingPunct="1">
+              <a:spcBef>
+                <a:spcPct val="20000"/>
+              </a:spcBef>
+              <a:buFont typeface="Arial" pitchFamily="34" charset="0"/>
+              <a:buChar char="•"/>
+              <a:defRPr sz="2400" kern="1200">
+                <a:solidFill>
+                  <a:schemeClr val="tx1"/>
+                </a:solidFill>
+                <a:latin typeface="+mn-lt"/>
+                <a:ea typeface="+mn-ea"/>
+                <a:cs typeface="+mn-cs"/>
+              </a:defRPr>
+            </a:lvl3pPr>
+            <a:lvl4pPr marL="1600200" indent="-228600" algn="l" defTabSz="914400" rtl="0" eaLnBrk="1" latinLnBrk="0" hangingPunct="1">
+              <a:spcBef>
+                <a:spcPct val="20000"/>
+              </a:spcBef>
+              <a:buFont typeface="Arial" pitchFamily="34" charset="0"/>
+              <a:buChar char="–"/>
+              <a:defRPr sz="2000" kern="1200">
+                <a:solidFill>
+                  <a:schemeClr val="tx1"/>
+                </a:solidFill>
+                <a:latin typeface="+mn-lt"/>
+                <a:ea typeface="+mn-ea"/>
+                <a:cs typeface="+mn-cs"/>
+              </a:defRPr>
+            </a:lvl4pPr>
+            <a:lvl5pPr marL="2057400" indent="-228600" algn="l" defTabSz="914400" rtl="0" eaLnBrk="1" latinLnBrk="0" hangingPunct="1">
+              <a:spcBef>
+                <a:spcPct val="20000"/>
+              </a:spcBef>
+              <a:buFont typeface="Arial" pitchFamily="34" charset="0"/>
+              <a:buChar char="»"/>
+              <a:defRPr sz="2000" kern="1200">
+                <a:solidFill>
+                  <a:schemeClr val="tx1"/>
+                </a:solidFill>
+                <a:latin typeface="+mn-lt"/>
+                <a:ea typeface="+mn-ea"/>
+                <a:cs typeface="+mn-cs"/>
+              </a:defRPr>
+            </a:lvl5pPr>
+            <a:lvl6pPr marL="2514600" indent="-228600" algn="l" defTabSz="914400" rtl="0" eaLnBrk="1" latinLnBrk="0" hangingPunct="1">
+              <a:spcBef>
+                <a:spcPct val="20000"/>
+              </a:spcBef>
+              <a:buFont typeface="Arial" pitchFamily="34" charset="0"/>
+              <a:buChar char="•"/>
+              <a:defRPr sz="2000" kern="1200">
+                <a:solidFill>
+                  <a:schemeClr val="tx1"/>
+                </a:solidFill>
+                <a:latin typeface="+mn-lt"/>
+                <a:ea typeface="+mn-ea"/>
+                <a:cs typeface="+mn-cs"/>
+              </a:defRPr>
+            </a:lvl6pPr>
+            <a:lvl7pPr marL="2971800" indent="-228600" algn="l" defTabSz="914400" rtl="0" eaLnBrk="1" latinLnBrk="0" hangingPunct="1">
+              <a:spcBef>
+                <a:spcPct val="20000"/>
+              </a:spcBef>
+              <a:buFont typeface="Arial" pitchFamily="34" charset="0"/>
+              <a:buChar char="•"/>
+              <a:defRPr sz="2000" kern="1200">
+                <a:solidFill>
+                  <a:schemeClr val="tx1"/>
+                </a:solidFill>
+                <a:latin typeface="+mn-lt"/>
+                <a:ea typeface="+mn-ea"/>
+                <a:cs typeface="+mn-cs"/>
+              </a:defRPr>
+            </a:lvl7pPr>
+            <a:lvl8pPr marL="3429000" indent="-228600" algn="l" defTabSz="914400" rtl="0" eaLnBrk="1" latinLnBrk="0" hangingPunct="1">
+              <a:spcBef>
+                <a:spcPct val="20000"/>
+              </a:spcBef>
+              <a:buFont typeface="Arial" pitchFamily="34" charset="0"/>
+              <a:buChar char="•"/>
+              <a:defRPr sz="2000" kern="1200">
+                <a:solidFill>
+                  <a:schemeClr val="tx1"/>
+                </a:solidFill>
+                <a:latin typeface="+mn-lt"/>
+                <a:ea typeface="+mn-ea"/>
+                <a:cs typeface="+mn-cs"/>
+              </a:defRPr>
+            </a:lvl8pPr>
+            <a:lvl9pPr marL="3886200" indent="-228600" algn="l" defTabSz="914400" rtl="0" eaLnBrk="1" latinLnBrk="0" hangingPunct="1">
+              <a:spcBef>
+                <a:spcPct val="20000"/>
+              </a:spcBef>
+              <a:buFont typeface="Arial" pitchFamily="34" charset="0"/>
+              <a:buChar char="•"/>
+              <a:defRPr sz="2000" kern="1200">
+                <a:solidFill>
+                  <a:schemeClr val="tx1"/>
+                </a:solidFill>
+                <a:latin typeface="+mn-lt"/>
+                <a:ea typeface="+mn-ea"/>
+                <a:cs typeface="+mn-cs"/>
+              </a:defRPr>
+            </a:lvl9pPr>
+          </a:lstStyle>
+          <a:p>
+            <a:r>
+              <a:rPr lang="en-GB" sz="4800" dirty="0" smtClean="0"/>
+              <a:t>Barry is a 57 year old gardener who binge watched bargain hunt over the weekend and has decided to become an amateur art dealer.</a:t>
+            </a:r>
+          </a:p>
+          <a:p>
+            <a:r>
+              <a:rPr lang="en-GB" sz="4800" dirty="0" smtClean="0"/>
+              <a:t> He is looking to buy pieces from up and coming artists who may become the next Picasso so that he can sell them for profit to contribute to his retirement fund.</a:t>
+            </a:r>
+          </a:p>
+          <a:p>
+            <a:endParaRPr lang="en-GB" sz="2000" dirty="0"/>
+          </a:p>
+        </p:txBody>
+      </p:sp>
+      <p:pic>
+        <p:nvPicPr>
+          <p:cNvPr id="5122" name="Picture 2" descr="http://washington.uwex.edu/files/2010/06/12-mangardening.jpg"/>
+          <p:cNvPicPr>
+            <a:picLocks noChangeAspect="1" noChangeArrowheads="1"/>
+          </p:cNvPicPr>
+          <p:nvPr/>
+        </p:nvPicPr>
+        <p:blipFill>
+          <a:blip r:embed="rId2">
+            <a:extLst>
+              <a:ext uri="{28A0092B-C50C-407E-A947-70E740481C1C}">
+                <a14:useLocalDpi xmlns:a14="http://schemas.microsoft.com/office/drawing/2010/main" val="0"/>
+              </a:ext>
+            </a:extLst>
+          </a:blip>
+          <a:srcRect/>
+          <a:stretch>
+            <a:fillRect/>
+          </a:stretch>
+        </p:blipFill>
+        <p:spPr bwMode="auto">
+          <a:xfrm>
+            <a:off x="1952625" y="9594850"/>
+            <a:ext cx="13487400" cy="8983657"/>
+          </a:xfrm>
+          <a:prstGeom prst="rect">
+            <a:avLst/>
+          </a:prstGeom>
+          <a:noFill/>
+          <a:extLst>
+            <a:ext uri="{909E8E84-426E-40DD-AFC4-6F175D3DCCD1}">
+              <a14:hiddenFill xmlns:a14="http://schemas.microsoft.com/office/drawing/2010/main">
+                <a:solidFill>
+                  <a:srgbClr val="FFFFFF"/>
+                </a:solidFill>
+              </a14:hiddenFill>
+            </a:ext>
+          </a:extLst>
+        </p:spPr>
+      </p:pic>
+      <p:sp>
+        <p:nvSpPr>
+          <p:cNvPr id="4" name="TextBox 3"/>
+          <p:cNvSpPr txBox="1"/>
+          <p:nvPr/>
+        </p:nvSpPr>
+        <p:spPr>
+          <a:xfrm>
+            <a:off x="3438525" y="1054258"/>
+            <a:ext cx="10515600" cy="2215991"/>
+          </a:xfrm>
+          <a:prstGeom prst="rect">
+            <a:avLst/>
+          </a:prstGeom>
+          <a:noFill/>
+        </p:spPr>
+        <p:txBody>
+          <a:bodyPr wrap="square" rtlCol="0">
+            <a:spAutoFit/>
           </a:bodyPr>
           <a:lstStyle/>
           <a:p>
-            <a:endParaRPr/>
+            <a:r>
+              <a:rPr lang="en-GB" sz="13800" dirty="0" smtClean="0"/>
+              <a:t>User Personas</a:t>
+            </a:r>
+            <a:endParaRPr lang="en-GB" sz="13800" dirty="0"/>
           </a:p>
         </p:txBody>
       </p:sp>
     </p:spTree>
+    <p:extLst>
+      <p:ext uri="{BB962C8B-B14F-4D97-AF65-F5344CB8AC3E}">
+        <p14:creationId xmlns:p14="http://schemas.microsoft.com/office/powerpoint/2010/main" val="1588553856"/>
+      </p:ext>
+    </p:extLst>
   </p:cSld>
   <p:clrMapOvr>
     <a:masterClrMapping/>
@@ -820,36 +2172,224 @@
       </p:grpSpPr>
       <p:sp>
         <p:nvSpPr>
-          <p:cNvPr id="2" name="object 2"/>
-          <p:cNvSpPr/>
+          <p:cNvPr id="2" name="Content Placeholder 2"/>
+          <p:cNvSpPr txBox="1">
+            <a:spLocks/>
+          </p:cNvSpPr>
           <p:nvPr/>
         </p:nvSpPr>
         <p:spPr>
           <a:xfrm>
-            <a:off x="0" y="0"/>
-            <a:ext cx="16933291" cy="18982309"/>
+            <a:off x="1296635" y="8604250"/>
+            <a:ext cx="14119647" cy="9829800"/>
           </a:xfrm>
           <a:prstGeom prst="rect">
             <a:avLst/>
           </a:prstGeom>
-          <a:blipFill>
-            <a:blip r:embed="rId2" cstate="print"/>
-            <a:stretch>
-              <a:fillRect/>
-            </a:stretch>
-          </a:blipFill>
         </p:spPr>
         <p:txBody>
-          <a:bodyPr wrap="square" lIns="0" tIns="0" rIns="0" bIns="0" rtlCol="0">
-            <a:noAutofit/>
-          </a:bodyPr>
-          <a:lstStyle/>
-          <a:p>
-            <a:endParaRPr/>
+          <a:bodyPr/>
+          <a:lstStyle>
+            <a:lvl1pPr marL="342900" indent="-342900" algn="l" defTabSz="914400" rtl="0" eaLnBrk="1" latinLnBrk="0" hangingPunct="1">
+              <a:spcBef>
+                <a:spcPct val="20000"/>
+              </a:spcBef>
+              <a:buFont typeface="Arial" pitchFamily="34" charset="0"/>
+              <a:buChar char="•"/>
+              <a:defRPr sz="3200" kern="1200">
+                <a:solidFill>
+                  <a:schemeClr val="tx1"/>
+                </a:solidFill>
+                <a:latin typeface="+mn-lt"/>
+                <a:ea typeface="+mn-ea"/>
+                <a:cs typeface="+mn-cs"/>
+              </a:defRPr>
+            </a:lvl1pPr>
+            <a:lvl2pPr marL="742950" indent="-285750" algn="l" defTabSz="914400" rtl="0" eaLnBrk="1" latinLnBrk="0" hangingPunct="1">
+              <a:spcBef>
+                <a:spcPct val="20000"/>
+              </a:spcBef>
+              <a:buFont typeface="Arial" pitchFamily="34" charset="0"/>
+              <a:buChar char="–"/>
+              <a:defRPr sz="2800" kern="1200">
+                <a:solidFill>
+                  <a:schemeClr val="tx1"/>
+                </a:solidFill>
+                <a:latin typeface="+mn-lt"/>
+                <a:ea typeface="+mn-ea"/>
+                <a:cs typeface="+mn-cs"/>
+              </a:defRPr>
+            </a:lvl2pPr>
+            <a:lvl3pPr marL="1143000" indent="-228600" algn="l" defTabSz="914400" rtl="0" eaLnBrk="1" latinLnBrk="0" hangingPunct="1">
+              <a:spcBef>
+                <a:spcPct val="20000"/>
+              </a:spcBef>
+              <a:buFont typeface="Arial" pitchFamily="34" charset="0"/>
+              <a:buChar char="•"/>
+              <a:defRPr sz="2400" kern="1200">
+                <a:solidFill>
+                  <a:schemeClr val="tx1"/>
+                </a:solidFill>
+                <a:latin typeface="+mn-lt"/>
+                <a:ea typeface="+mn-ea"/>
+                <a:cs typeface="+mn-cs"/>
+              </a:defRPr>
+            </a:lvl3pPr>
+            <a:lvl4pPr marL="1600200" indent="-228600" algn="l" defTabSz="914400" rtl="0" eaLnBrk="1" latinLnBrk="0" hangingPunct="1">
+              <a:spcBef>
+                <a:spcPct val="20000"/>
+              </a:spcBef>
+              <a:buFont typeface="Arial" pitchFamily="34" charset="0"/>
+              <a:buChar char="–"/>
+              <a:defRPr sz="2000" kern="1200">
+                <a:solidFill>
+                  <a:schemeClr val="tx1"/>
+                </a:solidFill>
+                <a:latin typeface="+mn-lt"/>
+                <a:ea typeface="+mn-ea"/>
+                <a:cs typeface="+mn-cs"/>
+              </a:defRPr>
+            </a:lvl4pPr>
+            <a:lvl5pPr marL="2057400" indent="-228600" algn="l" defTabSz="914400" rtl="0" eaLnBrk="1" latinLnBrk="0" hangingPunct="1">
+              <a:spcBef>
+                <a:spcPct val="20000"/>
+              </a:spcBef>
+              <a:buFont typeface="Arial" pitchFamily="34" charset="0"/>
+              <a:buChar char="»"/>
+              <a:defRPr sz="2000" kern="1200">
+                <a:solidFill>
+                  <a:schemeClr val="tx1"/>
+                </a:solidFill>
+                <a:latin typeface="+mn-lt"/>
+                <a:ea typeface="+mn-ea"/>
+                <a:cs typeface="+mn-cs"/>
+              </a:defRPr>
+            </a:lvl5pPr>
+            <a:lvl6pPr marL="2514600" indent="-228600" algn="l" defTabSz="914400" rtl="0" eaLnBrk="1" latinLnBrk="0" hangingPunct="1">
+              <a:spcBef>
+                <a:spcPct val="20000"/>
+              </a:spcBef>
+              <a:buFont typeface="Arial" pitchFamily="34" charset="0"/>
+              <a:buChar char="•"/>
+              <a:defRPr sz="2000" kern="1200">
+                <a:solidFill>
+                  <a:schemeClr val="tx1"/>
+                </a:solidFill>
+                <a:latin typeface="+mn-lt"/>
+                <a:ea typeface="+mn-ea"/>
+                <a:cs typeface="+mn-cs"/>
+              </a:defRPr>
+            </a:lvl6pPr>
+            <a:lvl7pPr marL="2971800" indent="-228600" algn="l" defTabSz="914400" rtl="0" eaLnBrk="1" latinLnBrk="0" hangingPunct="1">
+              <a:spcBef>
+                <a:spcPct val="20000"/>
+              </a:spcBef>
+              <a:buFont typeface="Arial" pitchFamily="34" charset="0"/>
+              <a:buChar char="•"/>
+              <a:defRPr sz="2000" kern="1200">
+                <a:solidFill>
+                  <a:schemeClr val="tx1"/>
+                </a:solidFill>
+                <a:latin typeface="+mn-lt"/>
+                <a:ea typeface="+mn-ea"/>
+                <a:cs typeface="+mn-cs"/>
+              </a:defRPr>
+            </a:lvl7pPr>
+            <a:lvl8pPr marL="3429000" indent="-228600" algn="l" defTabSz="914400" rtl="0" eaLnBrk="1" latinLnBrk="0" hangingPunct="1">
+              <a:spcBef>
+                <a:spcPct val="20000"/>
+              </a:spcBef>
+              <a:buFont typeface="Arial" pitchFamily="34" charset="0"/>
+              <a:buChar char="•"/>
+              <a:defRPr sz="2000" kern="1200">
+                <a:solidFill>
+                  <a:schemeClr val="tx1"/>
+                </a:solidFill>
+                <a:latin typeface="+mn-lt"/>
+                <a:ea typeface="+mn-ea"/>
+                <a:cs typeface="+mn-cs"/>
+              </a:defRPr>
+            </a:lvl8pPr>
+            <a:lvl9pPr marL="3886200" indent="-228600" algn="l" defTabSz="914400" rtl="0" eaLnBrk="1" latinLnBrk="0" hangingPunct="1">
+              <a:spcBef>
+                <a:spcPct val="20000"/>
+              </a:spcBef>
+              <a:buFont typeface="Arial" pitchFamily="34" charset="0"/>
+              <a:buChar char="•"/>
+              <a:defRPr sz="2000" kern="1200">
+                <a:solidFill>
+                  <a:schemeClr val="tx1"/>
+                </a:solidFill>
+                <a:latin typeface="+mn-lt"/>
+                <a:ea typeface="+mn-ea"/>
+                <a:cs typeface="+mn-cs"/>
+              </a:defRPr>
+            </a:lvl9pPr>
+          </a:lstStyle>
+          <a:p>
+            <a:r>
+              <a:rPr lang="en-GB" sz="6000" dirty="0" smtClean="0"/>
+              <a:t>Antoinette-Clementine is a Coffee Artisan who writes words like 'love', 'hate' and 'pretentious' in different sizes and colours to convey their complex emotional struggles.</a:t>
+            </a:r>
+          </a:p>
+          <a:p>
+            <a:r>
+              <a:rPr lang="en-GB" sz="6000" dirty="0" smtClean="0"/>
+              <a:t>They want to share their art with the world and sell pieces to eventually make enough money to achieve their dream of owning a hot air balloon shaped like a coffee bean and ballooning across the Far East.</a:t>
+            </a:r>
+          </a:p>
+          <a:p>
+            <a:endParaRPr lang="en-GB" sz="6600" dirty="0"/>
           </a:p>
         </p:txBody>
       </p:sp>
+      <p:pic>
+        <p:nvPicPr>
+          <p:cNvPr id="7170" name="Picture 2" descr="http://bfy723jj4x-flywheel.netdna-ssl.com/wp-content/uploads/MAC32_MIDDLECLASS01.jpg"/>
+          <p:cNvPicPr>
+            <a:picLocks noChangeAspect="1" noChangeArrowheads="1"/>
+          </p:cNvPicPr>
+          <p:nvPr/>
+        </p:nvPicPr>
+        <p:blipFill>
+          <a:blip r:embed="rId3">
+            <a:extLst>
+              <a:ext uri="{28A0092B-C50C-407E-A947-70E740481C1C}">
+                <a14:useLocalDpi xmlns:a14="http://schemas.microsoft.com/office/drawing/2010/main" val="0"/>
+              </a:ext>
+            </a:extLst>
+          </a:blip>
+          <a:srcRect/>
+          <a:stretch>
+            <a:fillRect/>
+          </a:stretch>
+        </p:blipFill>
+        <p:spPr bwMode="auto">
+          <a:xfrm>
+            <a:off x="1003300" y="1517650"/>
+            <a:ext cx="14706319" cy="6172200"/>
+          </a:xfrm>
+          <a:prstGeom prst="rect">
+            <a:avLst/>
+          </a:prstGeom>
+          <a:noFill/>
+          <a:extLst>
+            <a:ext uri="{909E8E84-426E-40DD-AFC4-6F175D3DCCD1}">
+              <a14:hiddenFill xmlns:a14="http://schemas.microsoft.com/office/drawing/2010/main">
+                <a:solidFill>
+                  <a:srgbClr val="FFFFFF"/>
+                </a:solidFill>
+              </a14:hiddenFill>
+            </a:ext>
+          </a:extLst>
+        </p:spPr>
+      </p:pic>
     </p:spTree>
+    <p:extLst>
+      <p:ext uri="{BB962C8B-B14F-4D97-AF65-F5344CB8AC3E}">
+        <p14:creationId xmlns:p14="http://schemas.microsoft.com/office/powerpoint/2010/main" val="2970275538"/>
+      </p:ext>
+    </p:extLst>
   </p:cSld>
   <p:clrMapOvr>
     <a:masterClrMapping/>
@@ -883,36 +2423,219 @@
       </p:grpSpPr>
       <p:sp>
         <p:nvSpPr>
-          <p:cNvPr id="2" name="object 2"/>
-          <p:cNvSpPr/>
+          <p:cNvPr id="2" name="Content Placeholder 2"/>
+          <p:cNvSpPr txBox="1">
+            <a:spLocks/>
+          </p:cNvSpPr>
           <p:nvPr/>
         </p:nvSpPr>
         <p:spPr>
           <a:xfrm>
-            <a:off x="0" y="0"/>
-            <a:ext cx="17001109" cy="18982309"/>
+            <a:off x="698500" y="1365250"/>
+            <a:ext cx="15855950" cy="6629400"/>
           </a:xfrm>
           <a:prstGeom prst="rect">
             <a:avLst/>
           </a:prstGeom>
-          <a:blipFill>
-            <a:blip r:embed="rId2" cstate="print"/>
-            <a:stretch>
-              <a:fillRect/>
-            </a:stretch>
-          </a:blipFill>
         </p:spPr>
         <p:txBody>
-          <a:bodyPr wrap="square" lIns="0" tIns="0" rIns="0" bIns="0" rtlCol="0">
-            <a:noAutofit/>
-          </a:bodyPr>
-          <a:lstStyle/>
-          <a:p>
-            <a:endParaRPr/>
+          <a:bodyPr/>
+          <a:lstStyle>
+            <a:lvl1pPr marL="342900" indent="-342900" algn="l" defTabSz="914400" rtl="0" eaLnBrk="1" latinLnBrk="0" hangingPunct="1">
+              <a:spcBef>
+                <a:spcPct val="20000"/>
+              </a:spcBef>
+              <a:buFont typeface="Arial" pitchFamily="34" charset="0"/>
+              <a:buChar char="•"/>
+              <a:defRPr sz="3200" kern="1200">
+                <a:solidFill>
+                  <a:schemeClr val="tx1"/>
+                </a:solidFill>
+                <a:latin typeface="+mn-lt"/>
+                <a:ea typeface="+mn-ea"/>
+                <a:cs typeface="+mn-cs"/>
+              </a:defRPr>
+            </a:lvl1pPr>
+            <a:lvl2pPr marL="742950" indent="-285750" algn="l" defTabSz="914400" rtl="0" eaLnBrk="1" latinLnBrk="0" hangingPunct="1">
+              <a:spcBef>
+                <a:spcPct val="20000"/>
+              </a:spcBef>
+              <a:buFont typeface="Arial" pitchFamily="34" charset="0"/>
+              <a:buChar char="–"/>
+              <a:defRPr sz="2800" kern="1200">
+                <a:solidFill>
+                  <a:schemeClr val="tx1"/>
+                </a:solidFill>
+                <a:latin typeface="+mn-lt"/>
+                <a:ea typeface="+mn-ea"/>
+                <a:cs typeface="+mn-cs"/>
+              </a:defRPr>
+            </a:lvl2pPr>
+            <a:lvl3pPr marL="1143000" indent="-228600" algn="l" defTabSz="914400" rtl="0" eaLnBrk="1" latinLnBrk="0" hangingPunct="1">
+              <a:spcBef>
+                <a:spcPct val="20000"/>
+              </a:spcBef>
+              <a:buFont typeface="Arial" pitchFamily="34" charset="0"/>
+              <a:buChar char="•"/>
+              <a:defRPr sz="2400" kern="1200">
+                <a:solidFill>
+                  <a:schemeClr val="tx1"/>
+                </a:solidFill>
+                <a:latin typeface="+mn-lt"/>
+                <a:ea typeface="+mn-ea"/>
+                <a:cs typeface="+mn-cs"/>
+              </a:defRPr>
+            </a:lvl3pPr>
+            <a:lvl4pPr marL="1600200" indent="-228600" algn="l" defTabSz="914400" rtl="0" eaLnBrk="1" latinLnBrk="0" hangingPunct="1">
+              <a:spcBef>
+                <a:spcPct val="20000"/>
+              </a:spcBef>
+              <a:buFont typeface="Arial" pitchFamily="34" charset="0"/>
+              <a:buChar char="–"/>
+              <a:defRPr sz="2000" kern="1200">
+                <a:solidFill>
+                  <a:schemeClr val="tx1"/>
+                </a:solidFill>
+                <a:latin typeface="+mn-lt"/>
+                <a:ea typeface="+mn-ea"/>
+                <a:cs typeface="+mn-cs"/>
+              </a:defRPr>
+            </a:lvl4pPr>
+            <a:lvl5pPr marL="2057400" indent="-228600" algn="l" defTabSz="914400" rtl="0" eaLnBrk="1" latinLnBrk="0" hangingPunct="1">
+              <a:spcBef>
+                <a:spcPct val="20000"/>
+              </a:spcBef>
+              <a:buFont typeface="Arial" pitchFamily="34" charset="0"/>
+              <a:buChar char="»"/>
+              <a:defRPr sz="2000" kern="1200">
+                <a:solidFill>
+                  <a:schemeClr val="tx1"/>
+                </a:solidFill>
+                <a:latin typeface="+mn-lt"/>
+                <a:ea typeface="+mn-ea"/>
+                <a:cs typeface="+mn-cs"/>
+              </a:defRPr>
+            </a:lvl5pPr>
+            <a:lvl6pPr marL="2514600" indent="-228600" algn="l" defTabSz="914400" rtl="0" eaLnBrk="1" latinLnBrk="0" hangingPunct="1">
+              <a:spcBef>
+                <a:spcPct val="20000"/>
+              </a:spcBef>
+              <a:buFont typeface="Arial" pitchFamily="34" charset="0"/>
+              <a:buChar char="•"/>
+              <a:defRPr sz="2000" kern="1200">
+                <a:solidFill>
+                  <a:schemeClr val="tx1"/>
+                </a:solidFill>
+                <a:latin typeface="+mn-lt"/>
+                <a:ea typeface="+mn-ea"/>
+                <a:cs typeface="+mn-cs"/>
+              </a:defRPr>
+            </a:lvl6pPr>
+            <a:lvl7pPr marL="2971800" indent="-228600" algn="l" defTabSz="914400" rtl="0" eaLnBrk="1" latinLnBrk="0" hangingPunct="1">
+              <a:spcBef>
+                <a:spcPct val="20000"/>
+              </a:spcBef>
+              <a:buFont typeface="Arial" pitchFamily="34" charset="0"/>
+              <a:buChar char="•"/>
+              <a:defRPr sz="2000" kern="1200">
+                <a:solidFill>
+                  <a:schemeClr val="tx1"/>
+                </a:solidFill>
+                <a:latin typeface="+mn-lt"/>
+                <a:ea typeface="+mn-ea"/>
+                <a:cs typeface="+mn-cs"/>
+              </a:defRPr>
+            </a:lvl7pPr>
+            <a:lvl8pPr marL="3429000" indent="-228600" algn="l" defTabSz="914400" rtl="0" eaLnBrk="1" latinLnBrk="0" hangingPunct="1">
+              <a:spcBef>
+                <a:spcPct val="20000"/>
+              </a:spcBef>
+              <a:buFont typeface="Arial" pitchFamily="34" charset="0"/>
+              <a:buChar char="•"/>
+              <a:defRPr sz="2000" kern="1200">
+                <a:solidFill>
+                  <a:schemeClr val="tx1"/>
+                </a:solidFill>
+                <a:latin typeface="+mn-lt"/>
+                <a:ea typeface="+mn-ea"/>
+                <a:cs typeface="+mn-cs"/>
+              </a:defRPr>
+            </a:lvl8pPr>
+            <a:lvl9pPr marL="3886200" indent="-228600" algn="l" defTabSz="914400" rtl="0" eaLnBrk="1" latinLnBrk="0" hangingPunct="1">
+              <a:spcBef>
+                <a:spcPct val="20000"/>
+              </a:spcBef>
+              <a:buFont typeface="Arial" pitchFamily="34" charset="0"/>
+              <a:buChar char="•"/>
+              <a:defRPr sz="2000" kern="1200">
+                <a:solidFill>
+                  <a:schemeClr val="tx1"/>
+                </a:solidFill>
+                <a:latin typeface="+mn-lt"/>
+                <a:ea typeface="+mn-ea"/>
+                <a:cs typeface="+mn-cs"/>
+              </a:defRPr>
+            </a:lvl9pPr>
+          </a:lstStyle>
+          <a:p>
+            <a:pPr marL="457200" lvl="1" indent="0">
+              <a:buNone/>
+            </a:pPr>
+            <a:r>
+              <a:rPr lang="en-GB" sz="6000" dirty="0" smtClean="0"/>
+              <a:t>Marilyn has many negative opinions they regularly need to express and their friends have gotten sock of hearing about them, so they have resorted to becoming an art critic who crushes the hopes and dreams of aspiring artists in their spare time.</a:t>
+            </a:r>
+            <a:endParaRPr lang="en-GB" sz="6000" dirty="0"/>
           </a:p>
         </p:txBody>
       </p:sp>
+      <p:pic>
+        <p:nvPicPr>
+          <p:cNvPr id="6146" name="Picture 2" descr="http://i3.mirror.co.uk/incoming/article5928960.ece/ALTERNATES/s615b/PAY-Marily-Manson.jpg"/>
+          <p:cNvPicPr>
+            <a:picLocks noChangeAspect="1" noChangeArrowheads="1"/>
+          </p:cNvPicPr>
+          <p:nvPr/>
+        </p:nvPicPr>
+        <p:blipFill>
+          <a:blip r:embed="rId2">
+            <a:extLst>
+              <a:ext uri="{28A0092B-C50C-407E-A947-70E740481C1C}">
+                <a14:useLocalDpi xmlns:a14="http://schemas.microsoft.com/office/drawing/2010/main" val="0"/>
+              </a:ext>
+            </a:extLst>
+          </a:blip>
+          <a:srcRect/>
+          <a:stretch>
+            <a:fillRect/>
+          </a:stretch>
+        </p:blipFill>
+        <p:spPr bwMode="auto">
+          <a:xfrm>
+            <a:off x="2044700" y="9061450"/>
+            <a:ext cx="12801597" cy="8534400"/>
+          </a:xfrm>
+          <a:prstGeom prst="rect">
+            <a:avLst/>
+          </a:prstGeom>
+          <a:noFill/>
+          <a:extLst>
+            <a:ext uri="{909E8E84-426E-40DD-AFC4-6F175D3DCCD1}">
+              <a14:hiddenFill xmlns:a14="http://schemas.microsoft.com/office/drawing/2010/main">
+                <a:solidFill>
+                  <a:srgbClr val="FFFFFF"/>
+                </a:solidFill>
+              </a14:hiddenFill>
+            </a:ext>
+          </a:extLst>
+        </p:spPr>
+      </p:pic>
     </p:spTree>
+    <p:extLst>
+      <p:ext uri="{BB962C8B-B14F-4D97-AF65-F5344CB8AC3E}">
+        <p14:creationId xmlns:p14="http://schemas.microsoft.com/office/powerpoint/2010/main" val="2380327013"/>
+      </p:ext>
+    </p:extLst>
   </p:cSld>
   <p:clrMapOvr>
     <a:masterClrMapping/>
@@ -946,36 +2669,195 @@
       </p:grpSpPr>
       <p:sp>
         <p:nvSpPr>
-          <p:cNvPr id="2" name="object 2"/>
-          <p:cNvSpPr/>
+          <p:cNvPr id="2" name="TextBox 1"/>
+          <p:cNvSpPr txBox="1"/>
           <p:nvPr/>
         </p:nvSpPr>
         <p:spPr>
           <a:xfrm>
-            <a:off x="0" y="0"/>
-            <a:ext cx="16933291" cy="18982309"/>
+            <a:off x="3438525" y="1054258"/>
+            <a:ext cx="10515600" cy="2215991"/>
           </a:xfrm>
           <a:prstGeom prst="rect">
             <a:avLst/>
           </a:prstGeom>
-          <a:blipFill>
-            <a:blip r:embed="rId2" cstate="print"/>
-            <a:stretch>
-              <a:fillRect/>
-            </a:stretch>
-          </a:blipFill>
+          <a:noFill/>
         </p:spPr>
         <p:txBody>
-          <a:bodyPr wrap="square" lIns="0" tIns="0" rIns="0" bIns="0" rtlCol="0">
-            <a:noAutofit/>
+          <a:bodyPr wrap="square" rtlCol="0">
+            <a:spAutoFit/>
           </a:bodyPr>
           <a:lstStyle/>
           <a:p>
-            <a:endParaRPr/>
+            <a:r>
+              <a:rPr lang="en-GB" sz="13800" dirty="0" smtClean="0"/>
+              <a:t>Requirements</a:t>
+            </a:r>
+            <a:endParaRPr lang="en-GB" sz="13800" dirty="0"/>
+          </a:p>
+        </p:txBody>
+      </p:sp>
+      <p:sp>
+        <p:nvSpPr>
+          <p:cNvPr id="3" name="TextBox 2"/>
+          <p:cNvSpPr txBox="1"/>
+          <p:nvPr/>
+        </p:nvSpPr>
+        <p:spPr>
+          <a:xfrm>
+            <a:off x="1187450" y="5937250"/>
+            <a:ext cx="14401800" cy="11603176"/>
+          </a:xfrm>
+          <a:prstGeom prst="rect">
+            <a:avLst/>
+          </a:prstGeom>
+          <a:noFill/>
+        </p:spPr>
+        <p:txBody>
+          <a:bodyPr wrap="square" rtlCol="0">
+            <a:spAutoFit/>
+          </a:bodyPr>
+          <a:lstStyle/>
+          <a:p>
+            <a:r>
+              <a:rPr lang="en-GB" sz="4400" dirty="0" smtClean="0"/>
+              <a:t>Users must be able to:</a:t>
+            </a:r>
+          </a:p>
+          <a:p>
+            <a:endParaRPr lang="en-GB" sz="4400" dirty="0"/>
+          </a:p>
+          <a:p>
+            <a:endParaRPr lang="en-GB" sz="4400" dirty="0" smtClean="0"/>
+          </a:p>
+          <a:p>
+            <a:pPr marL="571500" indent="-571500">
+              <a:buFont typeface="Arial" panose="020B0604020202020204" pitchFamily="34" charset="0"/>
+              <a:buChar char="•"/>
+            </a:pPr>
+            <a:r>
+              <a:rPr lang="en-GB" sz="4400" dirty="0" smtClean="0"/>
+              <a:t>View artwork</a:t>
+            </a:r>
+          </a:p>
+          <a:p>
+            <a:pPr marL="571500" indent="-571500">
+              <a:buFont typeface="Arial" panose="020B0604020202020204" pitchFamily="34" charset="0"/>
+              <a:buChar char="•"/>
+            </a:pPr>
+            <a:r>
+              <a:rPr lang="en-GB" sz="4400" dirty="0" smtClean="0"/>
+              <a:t>Rate artwork</a:t>
+            </a:r>
+          </a:p>
+          <a:p>
+            <a:pPr marL="571500" indent="-571500">
+              <a:buFont typeface="Arial" panose="020B0604020202020204" pitchFamily="34" charset="0"/>
+              <a:buChar char="•"/>
+            </a:pPr>
+            <a:r>
+              <a:rPr lang="en-GB" sz="4400" dirty="0" smtClean="0"/>
+              <a:t>Comment on artwork</a:t>
+            </a:r>
+          </a:p>
+          <a:p>
+            <a:pPr marL="571500" indent="-571500">
+              <a:buFont typeface="Arial" panose="020B0604020202020204" pitchFamily="34" charset="0"/>
+              <a:buChar char="•"/>
+            </a:pPr>
+            <a:r>
+              <a:rPr lang="en-GB" sz="4400" dirty="0" smtClean="0"/>
+              <a:t>Create an account</a:t>
+            </a:r>
+          </a:p>
+          <a:p>
+            <a:pPr marL="571500" indent="-571500">
+              <a:buFont typeface="Arial" panose="020B0604020202020204" pitchFamily="34" charset="0"/>
+              <a:buChar char="•"/>
+            </a:pPr>
+            <a:r>
+              <a:rPr lang="en-GB" sz="4400" dirty="0" smtClean="0"/>
+              <a:t>Edit/Delete their account</a:t>
+            </a:r>
+          </a:p>
+          <a:p>
+            <a:pPr marL="571500" indent="-571500">
+              <a:buFont typeface="Arial" panose="020B0604020202020204" pitchFamily="34" charset="0"/>
+              <a:buChar char="•"/>
+            </a:pPr>
+            <a:r>
+              <a:rPr lang="en-GB" sz="4400" dirty="0" smtClean="0"/>
+              <a:t>View latest news from company</a:t>
+            </a:r>
+          </a:p>
+          <a:p>
+            <a:pPr marL="571500" indent="-571500">
+              <a:buFont typeface="Arial" panose="020B0604020202020204" pitchFamily="34" charset="0"/>
+              <a:buChar char="•"/>
+            </a:pPr>
+            <a:r>
+              <a:rPr lang="en-GB" sz="4400" dirty="0" smtClean="0"/>
+              <a:t>Search artwork by tags</a:t>
+            </a:r>
+          </a:p>
+          <a:p>
+            <a:pPr marL="571500" indent="-571500">
+              <a:buFont typeface="Arial" panose="020B0604020202020204" pitchFamily="34" charset="0"/>
+              <a:buChar char="•"/>
+            </a:pPr>
+            <a:r>
+              <a:rPr lang="en-GB" sz="4400" dirty="0" smtClean="0"/>
+              <a:t>Sort artwork by categories</a:t>
+            </a:r>
+          </a:p>
+          <a:p>
+            <a:pPr marL="571500" indent="-571500">
+              <a:buFont typeface="Arial" panose="020B0604020202020204" pitchFamily="34" charset="0"/>
+              <a:buChar char="•"/>
+            </a:pPr>
+            <a:r>
+              <a:rPr lang="en-GB" sz="4400" dirty="0" smtClean="0"/>
+              <a:t>Change currency of artworks</a:t>
+            </a:r>
+          </a:p>
+          <a:p>
+            <a:pPr marL="571500" indent="-571500">
+              <a:buFont typeface="Arial" panose="020B0604020202020204" pitchFamily="34" charset="0"/>
+              <a:buChar char="•"/>
+            </a:pPr>
+            <a:r>
+              <a:rPr lang="en-GB" sz="4400" dirty="0" smtClean="0"/>
+              <a:t>Upload pictures of their artwork</a:t>
+            </a:r>
+          </a:p>
+          <a:p>
+            <a:pPr marL="571500" indent="-571500">
+              <a:buFont typeface="Arial" panose="020B0604020202020204" pitchFamily="34" charset="0"/>
+              <a:buChar char="•"/>
+            </a:pPr>
+            <a:r>
+              <a:rPr lang="en-GB" sz="4400" dirty="0" smtClean="0"/>
+              <a:t>Upload profile pictures</a:t>
+            </a:r>
+            <a:endParaRPr lang="en-GB" sz="4400" dirty="0"/>
+          </a:p>
+          <a:p>
+            <a:endParaRPr lang="en-GB" sz="4400" dirty="0" smtClean="0"/>
+          </a:p>
+          <a:p>
+            <a:endParaRPr lang="en-GB" sz="4400" dirty="0"/>
+          </a:p>
+          <a:p>
+            <a:endParaRPr lang="en-GB" sz="4400" dirty="0" smtClean="0"/>
           </a:p>
         </p:txBody>
       </p:sp>
     </p:spTree>
+    <p:extLst>
+      <p:ext uri="{BB962C8B-B14F-4D97-AF65-F5344CB8AC3E}">
+        <p14:creationId xmlns:p14="http://schemas.microsoft.com/office/powerpoint/2010/main" val="3817021722"/>
+      </p:ext>
+    </p:extLst>
   </p:cSld>
   <p:clrMapOvr>
     <a:masterClrMapping/>
@@ -1007,16 +2889,70 @@
           <a:chExt cx="0" cy="0"/>
         </a:xfrm>
       </p:grpSpPr>
+      <p:pic>
+        <p:nvPicPr>
+          <p:cNvPr id="2051" name="Picture 3"/>
+          <p:cNvPicPr>
+            <a:picLocks noChangeAspect="1" noChangeArrowheads="1"/>
+          </p:cNvPicPr>
+          <p:nvPr/>
+        </p:nvPicPr>
+        <p:blipFill>
+          <a:blip r:embed="rId2">
+            <a:extLst>
+              <a:ext uri="{28A0092B-C50C-407E-A947-70E740481C1C}">
+                <a14:useLocalDpi xmlns:a14="http://schemas.microsoft.com/office/drawing/2010/main" val="0"/>
+              </a:ext>
+            </a:extLst>
+          </a:blip>
+          <a:srcRect/>
+          <a:stretch>
+            <a:fillRect/>
+          </a:stretch>
+        </p:blipFill>
+        <p:spPr bwMode="auto">
+          <a:xfrm>
+            <a:off x="1644650" y="3803650"/>
+            <a:ext cx="13106400" cy="14720248"/>
+          </a:xfrm>
+          <a:prstGeom prst="rect">
+            <a:avLst/>
+          </a:prstGeom>
+          <a:noFill/>
+          <a:ln>
+            <a:noFill/>
+          </a:ln>
+          <a:extLst>
+            <a:ext uri="{909E8E84-426E-40DD-AFC4-6F175D3DCCD1}">
+              <a14:hiddenFill xmlns:a14="http://schemas.microsoft.com/office/drawing/2010/main">
+                <a:solidFill>
+                  <a:schemeClr val="accent1"/>
+                </a:solidFill>
+              </a14:hiddenFill>
+            </a:ext>
+            <a:ext uri="{91240B29-F687-4F45-9708-019B960494DF}">
+              <a14:hiddenLine xmlns:a14="http://schemas.microsoft.com/office/drawing/2010/main" w="9525">
+                <a:solidFill>
+                  <a:schemeClr val="tx1"/>
+                </a:solidFill>
+                <a:miter lim="800000"/>
+                <a:headEnd/>
+                <a:tailEnd/>
+              </a14:hiddenLine>
+            </a:ext>
+          </a:extLst>
+        </p:spPr>
+      </p:pic>
       <p:sp>
         <p:nvSpPr>
-          <p:cNvPr id="3" name="TextBox 2"/>
+          <p:cNvPr id="4" name="TextBox 3"/>
           <p:cNvSpPr txBox="1"/>
           <p:nvPr/>
         </p:nvSpPr>
         <p:spPr>
           <a:xfrm>
-            <a:off x="1416050" y="4565650"/>
-            <a:ext cx="14782800" cy="13388280"/>
+            <a:off x="2571750" y="1136650"/>
+            <a:ext cx="14401800" cy="1862048"/>
           </a:xfrm>
           <a:prstGeom prst="rect">
             <a:avLst/>
@@ -1029,294 +2965,18 @@
           </a:bodyPr>
           <a:lstStyle/>
           <a:p>
-            <a:pPr marL="685800" lvl="0" indent="-685800">
-              <a:buFont typeface="Arial" panose="020B0604020202020204" pitchFamily="34" charset="0"/>
-              <a:buChar char="•"/>
-            </a:pPr>
-            <a:r>
-              <a:rPr lang="en-GB" sz="4800" dirty="0"/>
-              <a:t>/home</a:t>
-            </a:r>
-            <a:endParaRPr lang="en-GB" sz="4400" dirty="0"/>
-          </a:p>
-          <a:p>
-            <a:pPr marL="685800" lvl="0" indent="-685800">
-              <a:buFont typeface="Arial" panose="020B0604020202020204" pitchFamily="34" charset="0"/>
-              <a:buChar char="•"/>
-            </a:pPr>
-            <a:r>
-              <a:rPr lang="en-GB" sz="4800" dirty="0"/>
-              <a:t>/site-news</a:t>
-            </a:r>
-            <a:endParaRPr lang="en-GB" sz="4400" dirty="0"/>
-          </a:p>
-          <a:p>
-            <a:pPr marL="685800" lvl="0" indent="-685800">
-              <a:buFont typeface="Arial" panose="020B0604020202020204" pitchFamily="34" charset="0"/>
-              <a:buChar char="•"/>
-            </a:pPr>
-            <a:r>
-              <a:rPr lang="en-GB" sz="4800" dirty="0"/>
-              <a:t>/about</a:t>
-            </a:r>
-            <a:endParaRPr lang="en-GB" sz="4400" dirty="0"/>
-          </a:p>
-          <a:p>
-            <a:pPr marL="685800" lvl="0" indent="-685800">
-              <a:buFont typeface="Arial" panose="020B0604020202020204" pitchFamily="34" charset="0"/>
-              <a:buChar char="•"/>
-            </a:pPr>
-            <a:r>
-              <a:rPr lang="en-GB" sz="4800" dirty="0"/>
-              <a:t>/index</a:t>
-            </a:r>
-            <a:endParaRPr lang="en-GB" sz="4400" dirty="0"/>
-          </a:p>
-          <a:p>
-            <a:pPr marL="685800" lvl="0" indent="-685800">
-              <a:buFont typeface="Arial" panose="020B0604020202020204" pitchFamily="34" charset="0"/>
-              <a:buChar char="•"/>
-            </a:pPr>
-            <a:r>
-              <a:rPr lang="en-GB" sz="4800" dirty="0"/>
-              <a:t>/</a:t>
-            </a:r>
-            <a:r>
-              <a:rPr lang="en-GB" sz="4800" dirty="0" smtClean="0"/>
-              <a:t>contact-us</a:t>
-            </a:r>
-            <a:endParaRPr lang="en-GB" sz="4400" dirty="0"/>
-          </a:p>
-          <a:p>
-            <a:pPr marL="685800" lvl="0" indent="-685800">
-              <a:buFont typeface="Arial" panose="020B0604020202020204" pitchFamily="34" charset="0"/>
-              <a:buChar char="•"/>
-            </a:pPr>
-            <a:r>
-              <a:rPr lang="en-GB" sz="4800" dirty="0" smtClean="0"/>
-              <a:t>/view</a:t>
-            </a:r>
-            <a:endParaRPr lang="en-GB" sz="4400" dirty="0"/>
-          </a:p>
-          <a:p>
-            <a:pPr marL="1600200" lvl="2" indent="-685800">
-              <a:buFont typeface="Arial" panose="020B0604020202020204" pitchFamily="34" charset="0"/>
-              <a:buChar char="•"/>
-            </a:pPr>
-            <a:r>
-              <a:rPr lang="en-GB" sz="4800" dirty="0" smtClean="0"/>
-              <a:t>/view</a:t>
-            </a:r>
-            <a:r>
-              <a:rPr lang="en-GB" sz="4800" dirty="0"/>
-              <a:t>/{{username</a:t>
-            </a:r>
-            <a:r>
-              <a:rPr lang="en-GB" sz="4800" dirty="0" smtClean="0"/>
-              <a:t>}}</a:t>
-            </a:r>
-            <a:endParaRPr lang="en-GB" sz="4400" dirty="0"/>
-          </a:p>
-          <a:p>
-            <a:pPr marL="685800" lvl="0" indent="-685800">
-              <a:buFont typeface="Arial" panose="020B0604020202020204" pitchFamily="34" charset="0"/>
-              <a:buChar char="•"/>
-            </a:pPr>
-            <a:r>
-              <a:rPr lang="en-GB" sz="4800" dirty="0"/>
-              <a:t>/</a:t>
-            </a:r>
-            <a:r>
-              <a:rPr lang="en-GB" sz="4800" dirty="0" smtClean="0"/>
-              <a:t>login</a:t>
-            </a:r>
-            <a:endParaRPr lang="en-GB" sz="4400" dirty="0" smtClean="0"/>
-          </a:p>
-          <a:p>
-            <a:pPr marL="1600200" lvl="2" indent="-685800">
-              <a:buFont typeface="Arial" panose="020B0604020202020204" pitchFamily="34" charset="0"/>
-              <a:buChar char="•"/>
-            </a:pPr>
-            <a:r>
-              <a:rPr lang="en-GB" sz="4800" dirty="0" smtClean="0"/>
-              <a:t>/login/</a:t>
-            </a:r>
-            <a:r>
-              <a:rPr lang="en-GB" sz="4800" dirty="0" err="1" smtClean="0"/>
-              <a:t>myaccount</a:t>
-            </a:r>
-            <a:endParaRPr lang="en-GB" sz="4400" dirty="0" smtClean="0"/>
-          </a:p>
-          <a:p>
-            <a:pPr marL="2514600" lvl="4" indent="-685800">
-              <a:buFont typeface="Arial" panose="020B0604020202020204" pitchFamily="34" charset="0"/>
-              <a:buChar char="•"/>
-            </a:pPr>
-            <a:r>
-              <a:rPr lang="en-GB" sz="4800" dirty="0" smtClean="0"/>
-              <a:t>/login/</a:t>
-            </a:r>
-            <a:r>
-              <a:rPr lang="en-GB" sz="4800" dirty="0" err="1" smtClean="0"/>
-              <a:t>myaccount</a:t>
-            </a:r>
-            <a:r>
-              <a:rPr lang="en-GB" sz="4800" dirty="0" smtClean="0"/>
-              <a:t>/upload</a:t>
-            </a:r>
-            <a:endParaRPr lang="en-GB" sz="4400" dirty="0"/>
-          </a:p>
-          <a:p>
-            <a:pPr marL="2514600" lvl="4" indent="-685800">
-              <a:buFont typeface="Arial" panose="020B0604020202020204" pitchFamily="34" charset="0"/>
-              <a:buChar char="•"/>
-            </a:pPr>
-            <a:r>
-              <a:rPr lang="en-GB" sz="4800" dirty="0" smtClean="0"/>
-              <a:t>/</a:t>
-            </a:r>
-            <a:r>
-              <a:rPr lang="en-GB" sz="4800" dirty="0"/>
-              <a:t>login/</a:t>
-            </a:r>
-            <a:r>
-              <a:rPr lang="en-GB" sz="4800" dirty="0" err="1"/>
-              <a:t>myaccount</a:t>
-            </a:r>
-            <a:r>
-              <a:rPr lang="en-GB" sz="4800" dirty="0"/>
-              <a:t>/settings</a:t>
-            </a:r>
-            <a:endParaRPr lang="en-GB" sz="4400" dirty="0"/>
-          </a:p>
-          <a:p>
-            <a:pPr marL="3429000" lvl="6" indent="-685800">
-              <a:buFont typeface="Arial" panose="020B0604020202020204" pitchFamily="34" charset="0"/>
-              <a:buChar char="•"/>
-            </a:pPr>
-            <a:r>
-              <a:rPr lang="en-GB" sz="4800" dirty="0"/>
-              <a:t>/login/</a:t>
-            </a:r>
-            <a:r>
-              <a:rPr lang="en-GB" sz="4800" dirty="0" err="1"/>
-              <a:t>myaccount</a:t>
-            </a:r>
-            <a:r>
-              <a:rPr lang="en-GB" sz="4800" dirty="0"/>
-              <a:t>/settings/{{</a:t>
-            </a:r>
-            <a:r>
-              <a:rPr lang="en-GB" sz="4800" dirty="0" err="1"/>
-              <a:t>artname</a:t>
-            </a:r>
-            <a:r>
-              <a:rPr lang="en-GB" sz="4800" dirty="0"/>
-              <a:t>}}</a:t>
-            </a:r>
-            <a:endParaRPr lang="en-GB" sz="4400" dirty="0"/>
-          </a:p>
-          <a:p>
-            <a:pPr marL="685800" lvl="0" indent="-685800">
-              <a:buFont typeface="Arial" panose="020B0604020202020204" pitchFamily="34" charset="0"/>
-              <a:buChar char="•"/>
-            </a:pPr>
-            <a:r>
-              <a:rPr lang="en-GB" sz="4800" dirty="0"/>
-              <a:t>/categories</a:t>
-            </a:r>
-            <a:endParaRPr lang="en-GB" sz="4400" dirty="0"/>
-          </a:p>
-          <a:p>
-            <a:pPr marL="1600200" lvl="2" indent="-685800">
-              <a:buFont typeface="Arial" panose="020B0604020202020204" pitchFamily="34" charset="0"/>
-              <a:buChar char="•"/>
-            </a:pPr>
-            <a:r>
-              <a:rPr lang="en-GB" sz="4800" dirty="0"/>
-              <a:t>/categories/painting</a:t>
-            </a:r>
-            <a:endParaRPr lang="en-GB" sz="4400" dirty="0"/>
-          </a:p>
-          <a:p>
-            <a:pPr marL="1600200" lvl="2" indent="-685800">
-              <a:buFont typeface="Arial" panose="020B0604020202020204" pitchFamily="34" charset="0"/>
-              <a:buChar char="•"/>
-            </a:pPr>
-            <a:r>
-              <a:rPr lang="en-GB" sz="4800" dirty="0"/>
-              <a:t>/categories/photography</a:t>
-            </a:r>
-            <a:endParaRPr lang="en-GB" sz="4400" dirty="0"/>
-          </a:p>
-          <a:p>
-            <a:pPr marL="1600200" lvl="2" indent="-685800">
-              <a:buFont typeface="Arial" panose="020B0604020202020204" pitchFamily="34" charset="0"/>
-              <a:buChar char="•"/>
-            </a:pPr>
-            <a:r>
-              <a:rPr lang="en-GB" sz="4800" dirty="0"/>
-              <a:t>/categories/sculptures</a:t>
-            </a:r>
-            <a:endParaRPr lang="en-GB" sz="4400" dirty="0"/>
-          </a:p>
-          <a:p>
-            <a:pPr marL="1600200" lvl="2" indent="-685800">
-              <a:buFont typeface="Arial" panose="020B0604020202020204" pitchFamily="34" charset="0"/>
-              <a:buChar char="•"/>
-            </a:pPr>
-            <a:r>
-              <a:rPr lang="en-GB" sz="4800" dirty="0"/>
-              <a:t>/categories/drawings</a:t>
-            </a:r>
-            <a:endParaRPr lang="en-GB" sz="4400" dirty="0"/>
-          </a:p>
-          <a:p>
-            <a:pPr marL="1600200" lvl="2" indent="-685800">
-              <a:buFont typeface="Arial" panose="020B0604020202020204" pitchFamily="34" charset="0"/>
-              <a:buChar char="•"/>
-            </a:pPr>
-            <a:r>
-              <a:rPr lang="en-GB" sz="4800" dirty="0"/>
-              <a:t>/categories/other</a:t>
-            </a:r>
-          </a:p>
-        </p:txBody>
-      </p:sp>
-      <p:sp>
-        <p:nvSpPr>
-          <p:cNvPr id="4" name="TextBox 3"/>
-          <p:cNvSpPr txBox="1"/>
-          <p:nvPr/>
-        </p:nvSpPr>
-        <p:spPr>
-          <a:xfrm>
-            <a:off x="4540250" y="1054259"/>
-            <a:ext cx="9067800" cy="2215991"/>
-          </a:xfrm>
-          <a:prstGeom prst="rect">
-            <a:avLst/>
-          </a:prstGeom>
-          <a:noFill/>
-        </p:spPr>
-        <p:txBody>
-          <a:bodyPr wrap="square" rtlCol="0">
-            <a:spAutoFit/>
-          </a:bodyPr>
-          <a:lstStyle/>
-          <a:p>
-            <a:r>
-              <a:rPr lang="en-GB" sz="13800" dirty="0" smtClean="0"/>
-              <a:t>Site URLS</a:t>
-            </a:r>
-            <a:endParaRPr lang="en-GB" sz="13800" dirty="0"/>
+            <a:r>
+              <a:rPr lang="en-GB" sz="11500" dirty="0" smtClean="0"/>
+              <a:t>System Architecture</a:t>
+            </a:r>
+            <a:endParaRPr lang="en-GB" sz="11500" dirty="0"/>
           </a:p>
         </p:txBody>
       </p:sp>
     </p:spTree>
     <p:extLst>
       <p:ext uri="{BB962C8B-B14F-4D97-AF65-F5344CB8AC3E}">
-        <p14:creationId xmlns:p14="http://schemas.microsoft.com/office/powerpoint/2010/main" val="3879730413"/>
+        <p14:creationId xmlns:p14="http://schemas.microsoft.com/office/powerpoint/2010/main" val="828955848"/>
       </p:ext>
     </p:extLst>
   </p:cSld>
@@ -1471,100 +3131,49 @@
           <a:chExt cx="0" cy="0"/>
         </a:xfrm>
       </p:grpSpPr>
-      <p:pic>
-        <p:nvPicPr>
-          <p:cNvPr id="2051" name="Picture 3"/>
-          <p:cNvPicPr>
-            <a:picLocks noChangeAspect="1" noChangeArrowheads="1"/>
-          </p:cNvPicPr>
+      <p:sp>
+        <p:nvSpPr>
+          <p:cNvPr id="2" name="object 2"/>
+          <p:cNvSpPr/>
           <p:nvPr/>
-        </p:nvPicPr>
-        <p:blipFill>
-          <a:blip r:embed="rId2">
-            <a:extLst>
-              <a:ext uri="{28A0092B-C50C-407E-A947-70E740481C1C}">
-                <a14:useLocalDpi xmlns:a14="http://schemas.microsoft.com/office/drawing/2010/main" val="0"/>
-              </a:ext>
-            </a:extLst>
-          </a:blip>
-          <a:srcRect/>
-          <a:stretch>
-            <a:fillRect/>
-          </a:stretch>
-        </p:blipFill>
-        <p:spPr bwMode="auto">
+        </p:nvSpPr>
+        <p:spPr>
           <a:xfrm>
-            <a:off x="1644650" y="3803650"/>
-            <a:ext cx="13106400" cy="14720248"/>
+            <a:off x="72009" y="0"/>
+            <a:ext cx="16933291" cy="18982309"/>
           </a:xfrm>
           <a:prstGeom prst="rect">
             <a:avLst/>
           </a:prstGeom>
-          <a:noFill/>
-          <a:ln>
-            <a:noFill/>
-          </a:ln>
-          <a:extLst>
-            <a:ext uri="{909E8E84-426E-40DD-AFC4-6F175D3DCCD1}">
-              <a14:hiddenFill xmlns:a14="http://schemas.microsoft.com/office/drawing/2010/main">
-                <a:solidFill>
-                  <a:schemeClr val="accent1"/>
-                </a:solidFill>
-              </a14:hiddenFill>
-            </a:ext>
-            <a:ext uri="{91240B29-F687-4F45-9708-019B960494DF}">
-              <a14:hiddenLine xmlns:a14="http://schemas.microsoft.com/office/drawing/2010/main" w="9525">
-                <a:solidFill>
-                  <a:schemeClr val="tx1"/>
-                </a:solidFill>
-                <a:miter lim="800000"/>
-                <a:headEnd/>
-                <a:tailEnd/>
-              </a14:hiddenLine>
-            </a:ext>
-          </a:extLst>
-        </p:spPr>
-      </p:pic>
-      <p:sp>
-        <p:nvSpPr>
-          <p:cNvPr id="4" name="TextBox 3"/>
-          <p:cNvSpPr txBox="1"/>
-          <p:nvPr/>
-        </p:nvSpPr>
-        <p:spPr>
-          <a:xfrm>
-            <a:off x="2571750" y="1136650"/>
-            <a:ext cx="14401800" cy="1862048"/>
-          </a:xfrm>
-          <a:prstGeom prst="rect">
-            <a:avLst/>
-          </a:prstGeom>
-          <a:noFill/>
+          <a:blipFill>
+            <a:blip r:embed="rId2" cstate="print"/>
+            <a:stretch>
+              <a:fillRect/>
+            </a:stretch>
+          </a:blipFill>
         </p:spPr>
         <p:txBody>
-          <a:bodyPr wrap="square" rtlCol="0">
-            <a:spAutoFit/>
+          <a:bodyPr wrap="square" lIns="0" tIns="0" rIns="0" bIns="0" rtlCol="0">
+            <a:noAutofit/>
           </a:bodyPr>
           <a:lstStyle/>
           <a:p>
-            <a:r>
-              <a:rPr lang="en-GB" sz="11500" dirty="0" smtClean="0"/>
-              <a:t>System Architecture</a:t>
-            </a:r>
-            <a:endParaRPr lang="en-GB" sz="11500" dirty="0"/>
+            <a:endParaRPr/>
           </a:p>
         </p:txBody>
       </p:sp>
     </p:spTree>
-    <p:extLst>
-      <p:ext uri="{BB962C8B-B14F-4D97-AF65-F5344CB8AC3E}">
-        <p14:creationId xmlns:p14="http://schemas.microsoft.com/office/powerpoint/2010/main" val="828955848"/>
-      </p:ext>
-    </p:extLst>
   </p:cSld>
   <p:clrMapOvr>
     <a:masterClrMapping/>
   </p:clrMapOvr>
+  <p:timing>
+    <p:tnLst>
+      <p:par>
+        <p:cTn id="1" dur="indefinite" restart="never" nodeType="tmRoot"/>
+      </p:par>
+    </p:tnLst>
+  </p:timing>
 </p:sld>
 </file>
 
@@ -1849,4 +3458,289 @@
   <a:objectDefaults/>
   <a:extraClrSchemeLst/>
 </a:theme>
+</file>
+
+<file path=ppt/theme/theme2.xml><?xml version="1.0" encoding="utf-8"?>
+<a:theme xmlns:a="http://schemas.openxmlformats.org/drawingml/2006/main" name="Office Theme">
+  <a:themeElements>
+    <a:clrScheme name="Office">
+      <a:dk1>
+        <a:sysClr val="windowText" lastClr="000000"/>
+      </a:dk1>
+      <a:lt1>
+        <a:sysClr val="window" lastClr="FFFFFF"/>
+      </a:lt1>
+      <a:dk2>
+        <a:srgbClr val="1F497D"/>
+      </a:dk2>
+      <a:lt2>
+        <a:srgbClr val="EEECE1"/>
+      </a:lt2>
+      <a:accent1>
+        <a:srgbClr val="4F81BD"/>
+      </a:accent1>
+      <a:accent2>
+        <a:srgbClr val="C0504D"/>
+      </a:accent2>
+      <a:accent3>
+        <a:srgbClr val="9BBB59"/>
+      </a:accent3>
+      <a:accent4>
+        <a:srgbClr val="8064A2"/>
+      </a:accent4>
+      <a:accent5>
+        <a:srgbClr val="4BACC6"/>
+      </a:accent5>
+      <a:accent6>
+        <a:srgbClr val="F79646"/>
+      </a:accent6>
+      <a:hlink>
+        <a:srgbClr val="0000FF"/>
+      </a:hlink>
+      <a:folHlink>
+        <a:srgbClr val="800080"/>
+      </a:folHlink>
+    </a:clrScheme>
+    <a:fontScheme name="Office">
+      <a:majorFont>
+        <a:latin typeface="Calibri"/>
+        <a:ea typeface=""/>
+        <a:cs typeface=""/>
+        <a:font script="Jpan" typeface="ＭＳ Ｐゴシック"/>
+        <a:font script="Hang" typeface="맑은 고딕"/>
+        <a:font script="Hans" typeface="宋体"/>
+        <a:font script="Hant" typeface="新細明體"/>
+        <a:font script="Arab" typeface="Times New Roman"/>
+        <a:font script="Hebr" typeface="Times New Roman"/>
+        <a:font script="Thai" typeface="Angsana New"/>
+        <a:font script="Ethi" typeface="Nyala"/>
+        <a:font script="Beng" typeface="Vrinda"/>
+        <a:font script="Gujr" typeface="Shruti"/>
+        <a:font script="Khmr" typeface="MoolBoran"/>
+        <a:font script="Knda" typeface="Tunga"/>
+        <a:font script="Guru" typeface="Raavi"/>
+        <a:font script="Cans" typeface="Euphemia"/>
+        <a:font script="Cher" typeface="Plantagenet Cherokee"/>
+        <a:font script="Yiii" typeface="Microsoft Yi Baiti"/>
+        <a:font script="Tibt" typeface="Microsoft Himalaya"/>
+        <a:font script="Thaa" typeface="MV Boli"/>
+        <a:font script="Deva" typeface="Mangal"/>
+        <a:font script="Telu" typeface="Gautami"/>
+        <a:font script="Taml" typeface="Latha"/>
+        <a:font script="Syrc" typeface="Estrangelo Edessa"/>
+        <a:font script="Orya" typeface="Kalinga"/>
+        <a:font script="Mlym" typeface="Kartika"/>
+        <a:font script="Laoo" typeface="DokChampa"/>
+        <a:font script="Sinh" typeface="Iskoola Pota"/>
+        <a:font script="Mong" typeface="Mongolian Baiti"/>
+        <a:font script="Viet" typeface="Times New Roman"/>
+        <a:font script="Uigh" typeface="Microsoft Uighur"/>
+        <a:font script="Geor" typeface="Sylfaen"/>
+      </a:majorFont>
+      <a:minorFont>
+        <a:latin typeface="Calibri"/>
+        <a:ea typeface=""/>
+        <a:cs typeface=""/>
+        <a:font script="Jpan" typeface="ＭＳ Ｐゴシック"/>
+        <a:font script="Hang" typeface="맑은 고딕"/>
+        <a:font script="Hans" typeface="宋体"/>
+        <a:font script="Hant" typeface="新細明體"/>
+        <a:font script="Arab" typeface="Arial"/>
+        <a:font script="Hebr" typeface="Arial"/>
+        <a:font script="Thai" typeface="Cordia New"/>
+        <a:font script="Ethi" typeface="Nyala"/>
+        <a:font script="Beng" typeface="Vrinda"/>
+        <a:font script="Gujr" typeface="Shruti"/>
+        <a:font script="Khmr" typeface="DaunPenh"/>
+        <a:font script="Knda" typeface="Tunga"/>
+        <a:font script="Guru" typeface="Raavi"/>
+        <a:font script="Cans" typeface="Euphemia"/>
+        <a:font script="Cher" typeface="Plantagenet Cherokee"/>
+        <a:font script="Yiii" typeface="Microsoft Yi Baiti"/>
+        <a:font script="Tibt" typeface="Microsoft Himalaya"/>
+        <a:font script="Thaa" typeface="MV Boli"/>
+        <a:font script="Deva" typeface="Mangal"/>
+        <a:font script="Telu" typeface="Gautami"/>
+        <a:font script="Taml" typeface="Latha"/>
+        <a:font script="Syrc" typeface="Estrangelo Edessa"/>
+        <a:font script="Orya" typeface="Kalinga"/>
+        <a:font script="Mlym" typeface="Kartika"/>
+        <a:font script="Laoo" typeface="DokChampa"/>
+        <a:font script="Sinh" typeface="Iskoola Pota"/>
+        <a:font script="Mong" typeface="Mongolian Baiti"/>
+        <a:font script="Viet" typeface="Arial"/>
+        <a:font script="Uigh" typeface="Microsoft Uighur"/>
+        <a:font script="Geor" typeface="Sylfaen"/>
+      </a:minorFont>
+    </a:fontScheme>
+    <a:fmtScheme name="Office">
+      <a:fillStyleLst>
+        <a:solidFill>
+          <a:schemeClr val="phClr"/>
+        </a:solidFill>
+        <a:gradFill rotWithShape="1">
+          <a:gsLst>
+            <a:gs pos="0">
+              <a:schemeClr val="phClr">
+                <a:tint val="50000"/>
+                <a:satMod val="300000"/>
+              </a:schemeClr>
+            </a:gs>
+            <a:gs pos="35000">
+              <a:schemeClr val="phClr">
+                <a:tint val="37000"/>
+                <a:satMod val="300000"/>
+              </a:schemeClr>
+            </a:gs>
+            <a:gs pos="100000">
+              <a:schemeClr val="phClr">
+                <a:tint val="15000"/>
+                <a:satMod val="350000"/>
+              </a:schemeClr>
+            </a:gs>
+          </a:gsLst>
+          <a:lin ang="16200000" scaled="1"/>
+        </a:gradFill>
+        <a:gradFill rotWithShape="1">
+          <a:gsLst>
+            <a:gs pos="0">
+              <a:schemeClr val="phClr">
+                <a:shade val="51000"/>
+                <a:satMod val="130000"/>
+              </a:schemeClr>
+            </a:gs>
+            <a:gs pos="80000">
+              <a:schemeClr val="phClr">
+                <a:shade val="93000"/>
+                <a:satMod val="130000"/>
+              </a:schemeClr>
+            </a:gs>
+            <a:gs pos="100000">
+              <a:schemeClr val="phClr">
+                <a:shade val="94000"/>
+                <a:satMod val="135000"/>
+              </a:schemeClr>
+            </a:gs>
+          </a:gsLst>
+          <a:lin ang="16200000" scaled="0"/>
+        </a:gradFill>
+      </a:fillStyleLst>
+      <a:lnStyleLst>
+        <a:ln w="9525" cap="flat" cmpd="sng" algn="ctr">
+          <a:solidFill>
+            <a:schemeClr val="phClr">
+              <a:shade val="95000"/>
+              <a:satMod val="105000"/>
+            </a:schemeClr>
+          </a:solidFill>
+          <a:prstDash val="solid"/>
+        </a:ln>
+        <a:ln w="25400" cap="flat" cmpd="sng" algn="ctr">
+          <a:solidFill>
+            <a:schemeClr val="phClr"/>
+          </a:solidFill>
+          <a:prstDash val="solid"/>
+        </a:ln>
+        <a:ln w="38100" cap="flat" cmpd="sng" algn="ctr">
+          <a:solidFill>
+            <a:schemeClr val="phClr"/>
+          </a:solidFill>
+          <a:prstDash val="solid"/>
+        </a:ln>
+      </a:lnStyleLst>
+      <a:effectStyleLst>
+        <a:effectStyle>
+          <a:effectLst>
+            <a:outerShdw blurRad="40000" dist="20000" dir="5400000" rotWithShape="0">
+              <a:srgbClr val="000000">
+                <a:alpha val="38000"/>
+              </a:srgbClr>
+            </a:outerShdw>
+          </a:effectLst>
+        </a:effectStyle>
+        <a:effectStyle>
+          <a:effectLst>
+            <a:outerShdw blurRad="40000" dist="23000" dir="5400000" rotWithShape="0">
+              <a:srgbClr val="000000">
+                <a:alpha val="35000"/>
+              </a:srgbClr>
+            </a:outerShdw>
+          </a:effectLst>
+        </a:effectStyle>
+        <a:effectStyle>
+          <a:effectLst>
+            <a:outerShdw blurRad="40000" dist="23000" dir="5400000" rotWithShape="0">
+              <a:srgbClr val="000000">
+                <a:alpha val="35000"/>
+              </a:srgbClr>
+            </a:outerShdw>
+          </a:effectLst>
+          <a:scene3d>
+            <a:camera prst="orthographicFront">
+              <a:rot lat="0" lon="0" rev="0"/>
+            </a:camera>
+            <a:lightRig rig="threePt" dir="t">
+              <a:rot lat="0" lon="0" rev="1200000"/>
+            </a:lightRig>
+          </a:scene3d>
+          <a:sp3d>
+            <a:bevelT w="63500" h="25400"/>
+          </a:sp3d>
+        </a:effectStyle>
+      </a:effectStyleLst>
+      <a:bgFillStyleLst>
+        <a:solidFill>
+          <a:schemeClr val="phClr"/>
+        </a:solidFill>
+        <a:gradFill rotWithShape="1">
+          <a:gsLst>
+            <a:gs pos="0">
+              <a:schemeClr val="phClr">
+                <a:tint val="40000"/>
+                <a:satMod val="350000"/>
+              </a:schemeClr>
+            </a:gs>
+            <a:gs pos="40000">
+              <a:schemeClr val="phClr">
+                <a:tint val="45000"/>
+                <a:shade val="99000"/>
+                <a:satMod val="350000"/>
+              </a:schemeClr>
+            </a:gs>
+            <a:gs pos="100000">
+              <a:schemeClr val="phClr">
+                <a:shade val="20000"/>
+                <a:satMod val="255000"/>
+              </a:schemeClr>
+            </a:gs>
+          </a:gsLst>
+          <a:path path="circle">
+            <a:fillToRect l="50000" t="-80000" r="50000" b="180000"/>
+          </a:path>
+        </a:gradFill>
+        <a:gradFill rotWithShape="1">
+          <a:gsLst>
+            <a:gs pos="0">
+              <a:schemeClr val="phClr">
+                <a:tint val="80000"/>
+                <a:satMod val="300000"/>
+              </a:schemeClr>
+            </a:gs>
+            <a:gs pos="100000">
+              <a:schemeClr val="phClr">
+                <a:shade val="30000"/>
+                <a:satMod val="200000"/>
+              </a:schemeClr>
+            </a:gs>
+          </a:gsLst>
+          <a:path path="circle">
+            <a:fillToRect l="50000" t="50000" r="50000" b="50000"/>
+          </a:path>
+        </a:gradFill>
+      </a:bgFillStyleLst>
+    </a:fmtScheme>
+  </a:themeElements>
+  <a:objectDefaults/>
+  <a:extraClrSchemeLst/>
+</a:theme>
 </file>
</xml_diff>